<commit_message>
:memo: Update: PPT 자료 수정
</commit_message>
<xml_diff>
--- a/2022-12-06/documents/CH_08 기하학 처리 & CH_09 변환영역 처리 & CH_10 영상 분할 및 특징 처리.pptx
+++ b/2022-12-06/documents/CH_08 기하학 처리 & CH_09 변환영역 처리 & CH_10 영상 분할 및 특징 처리.pptx
@@ -249,7 +249,7 @@
           <a:p>
             <a:fld id="{44C269C3-C25E-41E8-815A-55A10694EC72}" type="datetimeFigureOut">
               <a:rPr lang="ko-KR" altLang="en-US" smtClean="0"/>
-              <a:t>2022-12-04</a:t>
+              <a:t>2022-12-05</a:t>
             </a:fld>
             <a:endParaRPr lang="ko-KR" altLang="en-US"/>
           </a:p>
@@ -414,7 +414,7 @@
           <a:p>
             <a:fld id="{ADE0290A-1521-4E2C-B981-7952210E2E19}" type="datetimeFigureOut">
               <a:rPr lang="ko-KR" altLang="en-US" smtClean="0"/>
-              <a:t>2022-12-04</a:t>
+              <a:t>2022-12-05</a:t>
             </a:fld>
             <a:endParaRPr lang="ko-KR" altLang="en-US"/>
           </a:p>
@@ -1071,7 +1071,7 @@
             <a:fld id="{23A271A1-F6D6-438B-A432-4747EE7ECD40}" type="datetimeFigureOut">
               <a:rPr lang="en-US" smtClean="0"/>
               <a:pPr algn="ctr" eaLnBrk="1" latinLnBrk="0" hangingPunct="1"/>
-              <a:t>12/4/2022</a:t>
+              <a:t>12/5/2022</a:t>
             </a:fld>
             <a:endParaRPr lang="en-US" sz="1667" dirty="0">
               <a:solidFill>
@@ -1276,7 +1276,7 @@
             <a:fld id="{23A271A1-F6D6-438B-A432-4747EE7ECD40}" type="datetimeFigureOut">
               <a:rPr lang="en-US" smtClean="0"/>
               <a:pPr/>
-              <a:t>12/4/2022</a:t>
+              <a:t>12/5/2022</a:t>
             </a:fld>
             <a:endParaRPr lang="en-US" dirty="0"/>
           </a:p>
@@ -1478,7 +1478,7 @@
             <a:fld id="{23A271A1-F6D6-438B-A432-4747EE7ECD40}" type="datetimeFigureOut">
               <a:rPr lang="en-US" smtClean="0"/>
               <a:pPr/>
-              <a:t>12/4/2022</a:t>
+              <a:t>12/5/2022</a:t>
             </a:fld>
             <a:endParaRPr lang="en-US" dirty="0"/>
           </a:p>
@@ -1738,7 +1738,7 @@
             <a:fld id="{23A271A1-F6D6-438B-A432-4747EE7ECD40}" type="datetimeFigureOut">
               <a:rPr lang="en-US" smtClean="0"/>
               <a:pPr/>
-              <a:t>12/4/2022</a:t>
+              <a:t>12/5/2022</a:t>
             </a:fld>
             <a:endParaRPr lang="en-US" dirty="0"/>
           </a:p>
@@ -1927,7 +1927,7 @@
             <a:fld id="{23A271A1-F6D6-438B-A432-4747EE7ECD40}" type="datetimeFigureOut">
               <a:rPr lang="en-US" smtClean="0"/>
               <a:pPr/>
-              <a:t>12/4/2022</a:t>
+              <a:t>12/5/2022</a:t>
             </a:fld>
             <a:endParaRPr lang="en-US" dirty="0"/>
           </a:p>
@@ -2061,7 +2061,7 @@
             <a:fld id="{23A271A1-F6D6-438B-A432-4747EE7ECD40}" type="datetimeFigureOut">
               <a:rPr lang="en-US" smtClean="0"/>
               <a:pPr/>
-              <a:t>12/4/2022</a:t>
+              <a:t>12/5/2022</a:t>
             </a:fld>
             <a:endParaRPr lang="en-US" dirty="0"/>
           </a:p>
@@ -2252,7 +2252,7 @@
             <a:fld id="{23A271A1-F6D6-438B-A432-4747EE7ECD40}" type="datetimeFigureOut">
               <a:rPr lang="en-US" smtClean="0"/>
               <a:pPr/>
-              <a:t>12/4/2022</a:t>
+              <a:t>12/5/2022</a:t>
             </a:fld>
             <a:endParaRPr lang="en-US" dirty="0"/>
           </a:p>
@@ -2440,7 +2440,7 @@
             <a:fld id="{23A271A1-F6D6-438B-A432-4747EE7ECD40}" type="datetimeFigureOut">
               <a:rPr lang="en-US" smtClean="0"/>
               <a:pPr/>
-              <a:t>12/4/2022</a:t>
+              <a:t>12/5/2022</a:t>
             </a:fld>
             <a:endParaRPr lang="en-US" dirty="0"/>
           </a:p>
@@ -2637,7 +2637,7 @@
             <a:fld id="{23A271A1-F6D6-438B-A432-4747EE7ECD40}" type="datetimeFigureOut">
               <a:rPr lang="en-US" smtClean="0"/>
               <a:pPr/>
-              <a:t>12/4/2022</a:t>
+              <a:t>12/5/2022</a:t>
             </a:fld>
             <a:endParaRPr lang="en-US" dirty="0"/>
           </a:p>
@@ -2955,7 +2955,7 @@
             <a:fld id="{23A271A1-F6D6-438B-A432-4747EE7ECD40}" type="datetimeFigureOut">
               <a:rPr lang="en-US" smtClean="0"/>
               <a:pPr eaLnBrk="1" latinLnBrk="0" hangingPunct="1"/>
-              <a:t>12/4/2022</a:t>
+              <a:t>12/5/2022</a:t>
             </a:fld>
             <a:endParaRPr lang="en-US"/>
           </a:p>
@@ -3240,7 +3240,7 @@
             <a:fld id="{23A271A1-F6D6-438B-A432-4747EE7ECD40}" type="datetimeFigureOut">
               <a:rPr lang="en-US" smtClean="0"/>
               <a:pPr/>
-              <a:t>12/4/2022</a:t>
+              <a:t>12/5/2022</a:t>
             </a:fld>
             <a:endParaRPr lang="en-US" dirty="0"/>
           </a:p>
@@ -3364,7 +3364,7 @@
             <a:fld id="{23A271A1-F6D6-438B-A432-4747EE7ECD40}" type="datetimeFigureOut">
               <a:rPr lang="en-US" smtClean="0"/>
               <a:pPr eaLnBrk="1" latinLnBrk="0" hangingPunct="1"/>
-              <a:t>12/4/2022</a:t>
+              <a:t>12/5/2022</a:t>
             </a:fld>
             <a:endParaRPr lang="en-US"/>
           </a:p>
@@ -3751,7 +3751,7 @@
             <a:fld id="{23A271A1-F6D6-438B-A432-4747EE7ECD40}" type="datetimeFigureOut">
               <a:rPr lang="en-US" smtClean="0"/>
               <a:pPr eaLnBrk="1" latinLnBrk="0" hangingPunct="1"/>
-              <a:t>12/4/2022</a:t>
+              <a:t>12/5/2022</a:t>
             </a:fld>
             <a:endParaRPr lang="en-US"/>
           </a:p>
@@ -4101,7 +4101,7 @@
             <a:fld id="{23A271A1-F6D6-438B-A432-4747EE7ECD40}" type="datetimeFigureOut">
               <a:rPr lang="en-US" smtClean="0"/>
               <a:pPr eaLnBrk="1" latinLnBrk="0" hangingPunct="1"/>
-              <a:t>12/4/2022</a:t>
+              <a:t>12/5/2022</a:t>
             </a:fld>
             <a:endParaRPr lang="en-US"/>
           </a:p>
@@ -4411,7 +4411,7 @@
             <a:fld id="{23A271A1-F6D6-438B-A432-4747EE7ECD40}" type="datetimeFigureOut">
               <a:rPr lang="en-US" smtClean="0"/>
               <a:pPr/>
-              <a:t>12/4/2022</a:t>
+              <a:t>12/5/2022</a:t>
             </a:fld>
             <a:endParaRPr lang="en-US" dirty="0"/>
           </a:p>
@@ -4859,7 +4859,7 @@
             <a:fld id="{23A271A1-F6D6-438B-A432-4747EE7ECD40}" type="datetimeFigureOut">
               <a:rPr lang="en-US" smtClean="0"/>
               <a:pPr/>
-              <a:t>12/4/2022</a:t>
+              <a:t>12/5/2022</a:t>
             </a:fld>
             <a:endParaRPr lang="en-US" dirty="0"/>
           </a:p>
@@ -5005,7 +5005,7 @@
             <a:fld id="{23A271A1-F6D6-438B-A432-4747EE7ECD40}" type="datetimeFigureOut">
               <a:rPr lang="en-US" smtClean="0"/>
               <a:pPr/>
-              <a:t>12/4/2022</a:t>
+              <a:t>12/5/2022</a:t>
             </a:fld>
             <a:endParaRPr lang="en-US" dirty="0"/>
           </a:p>
@@ -5171,7 +5171,7 @@
             <a:fld id="{23A271A1-F6D6-438B-A432-4747EE7ECD40}" type="datetimeFigureOut">
               <a:rPr lang="en-US" smtClean="0"/>
               <a:pPr eaLnBrk="1" latinLnBrk="0" hangingPunct="1"/>
-              <a:t>12/4/2022</a:t>
+              <a:t>12/5/2022</a:t>
             </a:fld>
             <a:endParaRPr lang="en-US"/>
           </a:p>
@@ -5510,7 +5510,7 @@
             <a:fld id="{23A271A1-F6D6-438B-A432-4747EE7ECD40}" type="datetimeFigureOut">
               <a:rPr lang="en-US" smtClean="0"/>
               <a:pPr/>
-              <a:t>12/4/2022</a:t>
+              <a:t>12/5/2022</a:t>
             </a:fld>
             <a:endParaRPr lang="en-US" dirty="0"/>
           </a:p>
@@ -5789,7 +5789,7 @@
             <a:fld id="{23A271A1-F6D6-438B-A432-4747EE7ECD40}" type="datetimeFigureOut">
               <a:rPr lang="en-US" smtClean="0"/>
               <a:pPr/>
-              <a:t>12/4/2022</a:t>
+              <a:t>12/5/2022</a:t>
             </a:fld>
             <a:endParaRPr lang="en-US" dirty="0"/>
           </a:p>
@@ -6198,7 +6198,7 @@
             <a:fld id="{23A271A1-F6D6-438B-A432-4747EE7ECD40}" type="datetimeFigureOut">
               <a:rPr lang="en-US" smtClean="0"/>
               <a:pPr/>
-              <a:t>12/4/2022</a:t>
+              <a:t>12/5/2022</a:t>
             </a:fld>
             <a:endParaRPr lang="en-US" dirty="0"/>
           </a:p>
@@ -30166,185 +30166,14 @@
               <a:t>        </a:t>
             </a:r>
             <a:r>
-              <a:rPr lang="en-US" altLang="ko-KR" sz="1100" b="0" dirty="0">
-                <a:solidFill>
-                  <a:srgbClr val="9CDCFE"/>
-                </a:solidFill>
-                <a:effectLst/>
-                <a:latin typeface="ubuntu mono derivative powerline" panose="020B0509030602030204" pitchFamily="49" charset="0"/>
-              </a:rPr>
-              <a:t>a</a:t>
-            </a:r>
-            <a:r>
-              <a:rPr lang="en-US" altLang="ko-KR" sz="1100" b="0" dirty="0">
-                <a:solidFill>
-                  <a:srgbClr val="D4D4D4"/>
-                </a:solidFill>
-                <a:effectLst/>
-                <a:latin typeface="ubuntu mono derivative powerline" panose="020B0509030602030204" pitchFamily="49" charset="0"/>
-              </a:rPr>
-              <a:t>, </a:t>
-            </a:r>
-            <a:r>
-              <a:rPr lang="en-US" altLang="ko-KR" sz="1100" b="0" dirty="0">
-                <a:solidFill>
-                  <a:srgbClr val="9CDCFE"/>
-                </a:solidFill>
-                <a:effectLst/>
-                <a:latin typeface="ubuntu mono derivative powerline" panose="020B0509030602030204" pitchFamily="49" charset="0"/>
-              </a:rPr>
-              <a:t>b</a:t>
-            </a:r>
-            <a:r>
-              <a:rPr lang="en-US" altLang="ko-KR" sz="1100" b="0" dirty="0">
-                <a:solidFill>
-                  <a:srgbClr val="D4D4D4"/>
-                </a:solidFill>
-                <a:effectLst/>
-                <a:latin typeface="ubuntu mono derivative powerline" panose="020B0509030602030204" pitchFamily="49" charset="0"/>
-              </a:rPr>
-              <a:t> = </a:t>
-            </a:r>
-            <a:r>
-              <a:rPr lang="en-US" altLang="ko-KR" sz="1100" b="0" dirty="0" err="1">
-                <a:solidFill>
-                  <a:srgbClr val="4EC9B0"/>
-                </a:solidFill>
-                <a:effectLst/>
-                <a:latin typeface="ubuntu mono derivative powerline" panose="020B0509030602030204" pitchFamily="49" charset="0"/>
-              </a:rPr>
-              <a:t>math</a:t>
-            </a:r>
-            <a:r>
-              <a:rPr lang="en-US" altLang="ko-KR" sz="1100" b="0" dirty="0" err="1">
-                <a:solidFill>
-                  <a:srgbClr val="D4D4D4"/>
-                </a:solidFill>
-                <a:effectLst/>
-                <a:latin typeface="ubuntu mono derivative powerline" panose="020B0509030602030204" pitchFamily="49" charset="0"/>
-              </a:rPr>
-              <a:t>.</a:t>
-            </a:r>
-            <a:r>
-              <a:rPr lang="en-US" altLang="ko-KR" sz="1100" b="0" dirty="0" err="1">
-                <a:solidFill>
-                  <a:srgbClr val="DCDCAA"/>
-                </a:solidFill>
-                <a:effectLst/>
-                <a:latin typeface="ubuntu mono derivative powerline" panose="020B0509030602030204" pitchFamily="49" charset="0"/>
-              </a:rPr>
-              <a:t>cos</a:t>
-            </a:r>
-            <a:r>
-              <a:rPr lang="en-US" altLang="ko-KR" sz="1100" b="0" dirty="0">
-                <a:solidFill>
-                  <a:srgbClr val="D4D4D4"/>
-                </a:solidFill>
-                <a:effectLst/>
-                <a:latin typeface="ubuntu mono derivative powerline" panose="020B0509030602030204" pitchFamily="49" charset="0"/>
-              </a:rPr>
-              <a:t>(</a:t>
-            </a:r>
-            <a:r>
-              <a:rPr lang="en-US" altLang="ko-KR" sz="1100" b="0" dirty="0">
-                <a:solidFill>
-                  <a:srgbClr val="9CDCFE"/>
-                </a:solidFill>
-                <a:effectLst/>
-                <a:latin typeface="ubuntu mono derivative powerline" panose="020B0509030602030204" pitchFamily="49" charset="0"/>
-              </a:rPr>
-              <a:t>radian</a:t>
-            </a:r>
-            <a:r>
-              <a:rPr lang="en-US" altLang="ko-KR" sz="1100" b="0" dirty="0">
-                <a:solidFill>
-                  <a:srgbClr val="D4D4D4"/>
-                </a:solidFill>
-                <a:effectLst/>
-                <a:latin typeface="ubuntu mono derivative powerline" panose="020B0509030602030204" pitchFamily="49" charset="0"/>
-              </a:rPr>
-              <a:t>), </a:t>
-            </a:r>
-            <a:r>
-              <a:rPr lang="en-US" altLang="ko-KR" sz="1100" b="0" dirty="0" err="1">
-                <a:solidFill>
-                  <a:srgbClr val="4EC9B0"/>
-                </a:solidFill>
-                <a:effectLst/>
-                <a:latin typeface="ubuntu mono derivative powerline" panose="020B0509030602030204" pitchFamily="49" charset="0"/>
-              </a:rPr>
-              <a:t>math</a:t>
-            </a:r>
-            <a:r>
-              <a:rPr lang="en-US" altLang="ko-KR" sz="1100" b="0" dirty="0" err="1">
-                <a:solidFill>
-                  <a:srgbClr val="D4D4D4"/>
-                </a:solidFill>
-                <a:effectLst/>
-                <a:latin typeface="ubuntu mono derivative powerline" panose="020B0509030602030204" pitchFamily="49" charset="0"/>
-              </a:rPr>
-              <a:t>.</a:t>
-            </a:r>
-            <a:r>
-              <a:rPr lang="en-US" altLang="ko-KR" sz="1100" b="0" dirty="0" err="1">
-                <a:solidFill>
-                  <a:srgbClr val="DCDCAA"/>
-                </a:solidFill>
-                <a:effectLst/>
-                <a:latin typeface="ubuntu mono derivative powerline" panose="020B0509030602030204" pitchFamily="49" charset="0"/>
-              </a:rPr>
-              <a:t>sin</a:t>
-            </a:r>
-            <a:r>
-              <a:rPr lang="en-US" altLang="ko-KR" sz="1100" b="0" dirty="0">
-                <a:solidFill>
-                  <a:srgbClr val="D4D4D4"/>
-                </a:solidFill>
-                <a:effectLst/>
-                <a:latin typeface="ubuntu mono derivative powerline" panose="020B0509030602030204" pitchFamily="49" charset="0"/>
-              </a:rPr>
-              <a:t>(</a:t>
-            </a:r>
-            <a:r>
-              <a:rPr lang="en-US" altLang="ko-KR" sz="1100" b="0" dirty="0">
-                <a:solidFill>
-                  <a:srgbClr val="9CDCFE"/>
-                </a:solidFill>
-                <a:effectLst/>
-                <a:latin typeface="ubuntu mono derivative powerline" panose="020B0509030602030204" pitchFamily="49" charset="0"/>
-              </a:rPr>
-              <a:t>radian</a:t>
-            </a:r>
-            <a:r>
-              <a:rPr lang="en-US" altLang="ko-KR" sz="1100" b="0" dirty="0">
-                <a:solidFill>
-                  <a:srgbClr val="D4D4D4"/>
-                </a:solidFill>
-                <a:effectLst/>
-                <a:latin typeface="ubuntu mono derivative powerline" panose="020B0509030602030204" pitchFamily="49" charset="0"/>
-              </a:rPr>
-              <a:t>)</a:t>
-            </a:r>
-          </a:p>
-          <a:p>
-            <a:br>
-              <a:rPr lang="en-US" altLang="ko-KR" sz="1100" b="0" dirty="0">
-                <a:solidFill>
-                  <a:srgbClr val="D4D4D4"/>
-                </a:solidFill>
-                <a:effectLst/>
-                <a:latin typeface="ubuntu mono derivative powerline" panose="020B0509030602030204" pitchFamily="49" charset="0"/>
-              </a:rPr>
-            </a:br>
-            <a:r>
-              <a:rPr lang="en-US" altLang="ko-KR" sz="1100" b="0" dirty="0">
-                <a:solidFill>
-                  <a:srgbClr val="D4D4D4"/>
-                </a:solidFill>
-                <a:effectLst/>
-                <a:latin typeface="ubuntu mono derivative powerline" panose="020B0509030602030204" pitchFamily="49" charset="0"/>
-              </a:rPr>
-              <a:t>        </a:t>
+              <a:rPr lang="ko-KR" altLang="en-US" sz="1100" b="0" dirty="0">
+                <a:solidFill>
+                  <a:srgbClr val="D4D4D4"/>
+                </a:solidFill>
+                <a:effectLst/>
+                <a:latin typeface="ubuntu mono derivative powerline" panose="020B0509030602030204" pitchFamily="49" charset="0"/>
+              </a:rPr>
+              <a:t> </a:t>
             </a:r>
             <a:r>
               <a:rPr lang="en-US" altLang="ko-KR" sz="1100" b="0" dirty="0">
@@ -30354,7 +30183,7 @@
                 <a:effectLst/>
                 <a:latin typeface="ubuntu mono derivative powerline" panose="020B0509030602030204" pitchFamily="49" charset="0"/>
               </a:rPr>
-              <a:t># </a:t>
+              <a:t># x, y</a:t>
             </a:r>
             <a:r>
               <a:rPr lang="ko-KR" altLang="en-US" sz="1100" b="0" dirty="0">
@@ -30364,27 +30193,7 @@
                 <a:effectLst/>
                 <a:latin typeface="ubuntu mono derivative powerline" panose="020B0509030602030204" pitchFamily="49" charset="0"/>
               </a:rPr>
-              <a:t>직선 위 </a:t>
-            </a:r>
-            <a:r>
-              <a:rPr lang="en-US" altLang="ko-KR" sz="1100" b="0" dirty="0">
-                <a:solidFill>
-                  <a:srgbClr val="6A9955"/>
-                </a:solidFill>
-                <a:effectLst/>
-                <a:latin typeface="ubuntu mono derivative powerline" panose="020B0509030602030204" pitchFamily="49" charset="0"/>
-              </a:rPr>
-              <a:t>2</a:t>
-            </a:r>
-            <a:r>
-              <a:rPr lang="ko-KR" altLang="en-US" sz="1100" b="0" dirty="0">
-                <a:solidFill>
-                  <a:srgbClr val="6A9955"/>
-                </a:solidFill>
-                <a:effectLst/>
-                <a:latin typeface="ubuntu mono derivative powerline" panose="020B0509030602030204" pitchFamily="49" charset="0"/>
-              </a:rPr>
-              <a:t>개 좌표 계산</a:t>
+              <a:t>축에 대한 삼각비</a:t>
             </a:r>
             <a:endParaRPr lang="ko-KR" altLang="en-US" sz="1100" b="0" dirty="0">
               <a:solidFill>
@@ -30406,94 +30215,164 @@
               <a:t>        </a:t>
             </a:r>
             <a:r>
+              <a:rPr lang="en-US" altLang="ko-KR" sz="1100" b="0" dirty="0">
+                <a:solidFill>
+                  <a:srgbClr val="9CDCFE"/>
+                </a:solidFill>
+                <a:effectLst/>
+                <a:latin typeface="ubuntu mono derivative powerline" panose="020B0509030602030204" pitchFamily="49" charset="0"/>
+              </a:rPr>
+              <a:t>a</a:t>
+            </a:r>
+            <a:r>
+              <a:rPr lang="en-US" altLang="ko-KR" sz="1100" b="0" dirty="0">
+                <a:solidFill>
+                  <a:srgbClr val="D4D4D4"/>
+                </a:solidFill>
+                <a:effectLst/>
+                <a:latin typeface="ubuntu mono derivative powerline" panose="020B0509030602030204" pitchFamily="49" charset="0"/>
+              </a:rPr>
+              <a:t>, </a:t>
+            </a:r>
+            <a:r>
+              <a:rPr lang="en-US" altLang="ko-KR" sz="1100" b="0" dirty="0">
+                <a:solidFill>
+                  <a:srgbClr val="9CDCFE"/>
+                </a:solidFill>
+                <a:effectLst/>
+                <a:latin typeface="ubuntu mono derivative powerline" panose="020B0509030602030204" pitchFamily="49" charset="0"/>
+              </a:rPr>
+              <a:t>b</a:t>
+            </a:r>
+            <a:r>
+              <a:rPr lang="ko-KR" altLang="en-US" sz="1100" b="0" dirty="0">
+                <a:solidFill>
+                  <a:srgbClr val="D4D4D4"/>
+                </a:solidFill>
+                <a:effectLst/>
+                <a:latin typeface="ubuntu mono derivative powerline" panose="020B0509030602030204" pitchFamily="49" charset="0"/>
+              </a:rPr>
+              <a:t> </a:t>
+            </a:r>
+            <a:r>
+              <a:rPr lang="en-US" altLang="ko-KR" sz="1100" b="0" dirty="0">
+                <a:solidFill>
+                  <a:srgbClr val="D4D4D4"/>
+                </a:solidFill>
+                <a:effectLst/>
+                <a:latin typeface="ubuntu mono derivative powerline" panose="020B0509030602030204" pitchFamily="49" charset="0"/>
+              </a:rPr>
+              <a:t>= </a:t>
+            </a:r>
+            <a:r>
               <a:rPr lang="en-US" altLang="ko-KR" sz="1100" b="0" dirty="0" err="1">
                 <a:solidFill>
-                  <a:srgbClr val="9CDCFE"/>
-                </a:solidFill>
-                <a:effectLst/>
-                <a:latin typeface="ubuntu mono derivative powerline" panose="020B0509030602030204" pitchFamily="49" charset="0"/>
-              </a:rPr>
-              <a:t>pt</a:t>
-            </a:r>
-            <a:r>
-              <a:rPr lang="en-US" altLang="ko-KR" sz="1100" b="0" dirty="0">
-                <a:solidFill>
-                  <a:srgbClr val="D4D4D4"/>
-                </a:solidFill>
-                <a:effectLst/>
-                <a:latin typeface="ubuntu mono derivative powerline" panose="020B0509030602030204" pitchFamily="49" charset="0"/>
-              </a:rPr>
-              <a:t> = (</a:t>
-            </a:r>
-            <a:r>
-              <a:rPr lang="en-US" altLang="ko-KR" sz="1100" b="0" dirty="0">
-                <a:solidFill>
-                  <a:srgbClr val="9CDCFE"/>
-                </a:solidFill>
-                <a:effectLst/>
-                <a:latin typeface="ubuntu mono derivative powerline" panose="020B0509030602030204" pitchFamily="49" charset="0"/>
-              </a:rPr>
-              <a:t>a</a:t>
-            </a:r>
-            <a:r>
-              <a:rPr lang="en-US" altLang="ko-KR" sz="1100" b="0" dirty="0">
-                <a:solidFill>
-                  <a:srgbClr val="D4D4D4"/>
-                </a:solidFill>
-                <a:effectLst/>
-                <a:latin typeface="ubuntu mono derivative powerline" panose="020B0509030602030204" pitchFamily="49" charset="0"/>
-              </a:rPr>
-              <a:t> * </a:t>
-            </a:r>
-            <a:r>
-              <a:rPr lang="en-US" altLang="ko-KR" sz="1100" b="0" dirty="0">
-                <a:solidFill>
-                  <a:srgbClr val="9CDCFE"/>
-                </a:solidFill>
-                <a:effectLst/>
-                <a:latin typeface="ubuntu mono derivative powerline" panose="020B0509030602030204" pitchFamily="49" charset="0"/>
-              </a:rPr>
-              <a:t>rho</a:t>
-            </a:r>
-            <a:r>
-              <a:rPr lang="en-US" altLang="ko-KR" sz="1100" b="0" dirty="0">
-                <a:solidFill>
-                  <a:srgbClr val="D4D4D4"/>
-                </a:solidFill>
-                <a:effectLst/>
-                <a:latin typeface="ubuntu mono derivative powerline" panose="020B0509030602030204" pitchFamily="49" charset="0"/>
-              </a:rPr>
-              <a:t>, </a:t>
-            </a:r>
-            <a:r>
-              <a:rPr lang="en-US" altLang="ko-KR" sz="1100" b="0" dirty="0">
-                <a:solidFill>
-                  <a:srgbClr val="9CDCFE"/>
-                </a:solidFill>
-                <a:effectLst/>
-                <a:latin typeface="ubuntu mono derivative powerline" panose="020B0509030602030204" pitchFamily="49" charset="0"/>
-              </a:rPr>
-              <a:t>b</a:t>
-            </a:r>
-            <a:r>
-              <a:rPr lang="en-US" altLang="ko-KR" sz="1100" b="0" dirty="0">
-                <a:solidFill>
-                  <a:srgbClr val="D4D4D4"/>
-                </a:solidFill>
-                <a:effectLst/>
-                <a:latin typeface="ubuntu mono derivative powerline" panose="020B0509030602030204" pitchFamily="49" charset="0"/>
-              </a:rPr>
-              <a:t> * </a:t>
-            </a:r>
-            <a:r>
-              <a:rPr lang="en-US" altLang="ko-KR" sz="1100" b="0" dirty="0">
-                <a:solidFill>
-                  <a:srgbClr val="9CDCFE"/>
-                </a:solidFill>
-                <a:effectLst/>
-                <a:latin typeface="ubuntu mono derivative powerline" panose="020B0509030602030204" pitchFamily="49" charset="0"/>
-              </a:rPr>
-              <a:t>rho</a:t>
+                  <a:srgbClr val="4EC9B0"/>
+                </a:solidFill>
+                <a:effectLst/>
+                <a:latin typeface="ubuntu mono derivative powerline" panose="020B0509030602030204" pitchFamily="49" charset="0"/>
+              </a:rPr>
+              <a:t>math</a:t>
+            </a:r>
+            <a:r>
+              <a:rPr lang="en-US" altLang="ko-KR" sz="1100" b="0" dirty="0" err="1">
+                <a:solidFill>
+                  <a:srgbClr val="D4D4D4"/>
+                </a:solidFill>
+                <a:effectLst/>
+                <a:latin typeface="ubuntu mono derivative powerline" panose="020B0509030602030204" pitchFamily="49" charset="0"/>
+              </a:rPr>
+              <a:t>.</a:t>
+            </a:r>
+            <a:r>
+              <a:rPr lang="en-US" altLang="ko-KR" sz="1100" b="0" dirty="0" err="1">
+                <a:solidFill>
+                  <a:srgbClr val="DCDCAA"/>
+                </a:solidFill>
+                <a:effectLst/>
+                <a:latin typeface="ubuntu mono derivative powerline" panose="020B0509030602030204" pitchFamily="49" charset="0"/>
+              </a:rPr>
+              <a:t>cos</a:t>
+            </a:r>
+            <a:r>
+              <a:rPr lang="en-US" altLang="ko-KR" sz="1100" b="0" dirty="0">
+                <a:solidFill>
+                  <a:srgbClr val="D4D4D4"/>
+                </a:solidFill>
+                <a:effectLst/>
+                <a:latin typeface="ubuntu mono derivative powerline" panose="020B0509030602030204" pitchFamily="49" charset="0"/>
+              </a:rPr>
+              <a:t>(</a:t>
+            </a:r>
+            <a:r>
+              <a:rPr lang="en-US" altLang="ko-KR" sz="1100" b="0" dirty="0">
+                <a:solidFill>
+                  <a:srgbClr val="9CDCFE"/>
+                </a:solidFill>
+                <a:effectLst/>
+                <a:latin typeface="ubuntu mono derivative powerline" panose="020B0509030602030204" pitchFamily="49" charset="0"/>
+              </a:rPr>
+              <a:t>radian</a:t>
+            </a:r>
+            <a:r>
+              <a:rPr lang="en-US" altLang="ko-KR" sz="1100" b="0" dirty="0">
+                <a:solidFill>
+                  <a:srgbClr val="D4D4D4"/>
+                </a:solidFill>
+                <a:effectLst/>
+                <a:latin typeface="ubuntu mono derivative powerline" panose="020B0509030602030204" pitchFamily="49" charset="0"/>
+              </a:rPr>
+              <a:t>), </a:t>
+            </a:r>
+            <a:r>
+              <a:rPr lang="en-US" altLang="ko-KR" sz="1100" b="0" dirty="0" err="1">
+                <a:solidFill>
+                  <a:srgbClr val="4EC9B0"/>
+                </a:solidFill>
+                <a:effectLst/>
+                <a:latin typeface="ubuntu mono derivative powerline" panose="020B0509030602030204" pitchFamily="49" charset="0"/>
+              </a:rPr>
+              <a:t>math</a:t>
+            </a:r>
+            <a:r>
+              <a:rPr lang="en-US" altLang="ko-KR" sz="1100" b="0" dirty="0" err="1">
+                <a:solidFill>
+                  <a:srgbClr val="D4D4D4"/>
+                </a:solidFill>
+                <a:effectLst/>
+                <a:latin typeface="ubuntu mono derivative powerline" panose="020B0509030602030204" pitchFamily="49" charset="0"/>
+              </a:rPr>
+              <a:t>.</a:t>
+            </a:r>
+            <a:r>
+              <a:rPr lang="en-US" altLang="ko-KR" sz="1100" b="0" dirty="0" err="1">
+                <a:solidFill>
+                  <a:srgbClr val="DCDCAA"/>
+                </a:solidFill>
+                <a:effectLst/>
+                <a:latin typeface="ubuntu mono derivative powerline" panose="020B0509030602030204" pitchFamily="49" charset="0"/>
+              </a:rPr>
+              <a:t>sin</a:t>
+            </a:r>
+            <a:r>
+              <a:rPr lang="en-US" altLang="ko-KR" sz="1100" b="0" dirty="0">
+                <a:solidFill>
+                  <a:srgbClr val="D4D4D4"/>
+                </a:solidFill>
+                <a:effectLst/>
+                <a:latin typeface="ubuntu mono derivative powerline" panose="020B0509030602030204" pitchFamily="49" charset="0"/>
+              </a:rPr>
+              <a:t>(</a:t>
+            </a:r>
+            <a:r>
+              <a:rPr lang="en-US" altLang="ko-KR" sz="1100" b="0" dirty="0">
+                <a:solidFill>
+                  <a:srgbClr val="9CDCFE"/>
+                </a:solidFill>
+                <a:effectLst/>
+                <a:latin typeface="ubuntu mono derivative powerline" panose="020B0509030602030204" pitchFamily="49" charset="0"/>
+              </a:rPr>
+              <a:t>radian</a:t>
             </a:r>
             <a:r>
               <a:rPr lang="en-US" altLang="ko-KR" sz="1100" b="0" dirty="0">
@@ -30505,8 +30384,6 @@
               </a:rPr>
               <a:t>)</a:t>
             </a:r>
-          </a:p>
-          <a:p>
             <a:br>
               <a:rPr lang="en-US" altLang="ko-KR" sz="1100" b="0" dirty="0">
                 <a:solidFill>
@@ -30534,7 +30411,7 @@
                 <a:effectLst/>
                 <a:latin typeface="ubuntu mono derivative powerline" panose="020B0509030602030204" pitchFamily="49" charset="0"/>
               </a:rPr>
-              <a:t># </a:t>
+              <a:t># x, y</a:t>
             </a:r>
             <a:r>
               <a:rPr lang="ko-KR" altLang="en-US" sz="1100" b="0" dirty="0">
@@ -30544,7 +30421,47 @@
                 <a:effectLst/>
                 <a:latin typeface="ubuntu mono derivative powerline" panose="020B0509030602030204" pitchFamily="49" charset="0"/>
               </a:rPr>
-              <a:t>직선상의 이동 위치</a:t>
+              <a:t>축에 기준</a:t>
+            </a:r>
+            <a:r>
+              <a:rPr lang="en-US" altLang="ko-KR" sz="1100" b="0" dirty="0">
+                <a:solidFill>
+                  <a:srgbClr val="6A9955"/>
+                </a:solidFill>
+                <a:effectLst/>
+                <a:latin typeface="ubuntu mono derivative powerline" panose="020B0509030602030204" pitchFamily="49" charset="0"/>
+              </a:rPr>
+              <a:t>(</a:t>
+            </a:r>
+            <a:r>
+              <a:rPr lang="ko-KR" altLang="en-US" sz="1100" b="0" dirty="0">
+                <a:solidFill>
+                  <a:srgbClr val="6A9955"/>
+                </a:solidFill>
+                <a:effectLst/>
+                <a:latin typeface="ubuntu mono derivative powerline" panose="020B0509030602030204" pitchFamily="49" charset="0"/>
+              </a:rPr>
+              <a:t>절편</a:t>
+            </a:r>
+            <a:r>
+              <a:rPr lang="en-US" altLang="ko-KR" sz="1100" b="0" dirty="0">
+                <a:solidFill>
+                  <a:srgbClr val="6A9955"/>
+                </a:solidFill>
+                <a:effectLst/>
+                <a:latin typeface="ubuntu mono derivative powerline" panose="020B0509030602030204" pitchFamily="49" charset="0"/>
+              </a:rPr>
+              <a:t>) </a:t>
+            </a:r>
+            <a:r>
+              <a:rPr lang="ko-KR" altLang="en-US" sz="1100" b="0" dirty="0">
+                <a:solidFill>
+                  <a:srgbClr val="6A9955"/>
+                </a:solidFill>
+                <a:effectLst/>
+                <a:latin typeface="ubuntu mono derivative powerline" panose="020B0509030602030204" pitchFamily="49" charset="0"/>
+              </a:rPr>
+              <a:t>좌표</a:t>
             </a:r>
             <a:endParaRPr lang="ko-KR" altLang="en-US" sz="1100" b="0" dirty="0">
               <a:solidFill>
@@ -30566,37 +30483,47 @@
               <a:t>        </a:t>
             </a:r>
             <a:r>
-              <a:rPr lang="en-US" altLang="ko-KR" sz="1100" b="0" dirty="0">
-                <a:solidFill>
-                  <a:srgbClr val="9CDCFE"/>
-                </a:solidFill>
-                <a:effectLst/>
-                <a:latin typeface="ubuntu mono derivative powerline" panose="020B0509030602030204" pitchFamily="49" charset="0"/>
-              </a:rPr>
-              <a:t>delta</a:t>
-            </a:r>
-            <a:r>
-              <a:rPr lang="en-US" altLang="ko-KR" sz="1100" b="0" dirty="0">
-                <a:solidFill>
-                  <a:srgbClr val="D4D4D4"/>
-                </a:solidFill>
-                <a:effectLst/>
-                <a:latin typeface="ubuntu mono derivative powerline" panose="020B0509030602030204" pitchFamily="49" charset="0"/>
-              </a:rPr>
-              <a:t> = (-</a:t>
-            </a:r>
-            <a:r>
-              <a:rPr lang="en-US" altLang="ko-KR" sz="1100" b="0" dirty="0">
-                <a:solidFill>
-                  <a:srgbClr val="B5CEA8"/>
-                </a:solidFill>
-                <a:effectLst/>
-                <a:latin typeface="ubuntu mono derivative powerline" panose="020B0509030602030204" pitchFamily="49" charset="0"/>
-              </a:rPr>
-              <a:t>1000</a:t>
-            </a:r>
-            <a:r>
-              <a:rPr lang="en-US" altLang="ko-KR" sz="1100" b="0" dirty="0">
+              <a:rPr lang="en-US" altLang="ko-KR" sz="1100" b="0" dirty="0" err="1">
+                <a:solidFill>
+                  <a:srgbClr val="9CDCFE"/>
+                </a:solidFill>
+                <a:effectLst/>
+                <a:latin typeface="ubuntu mono derivative powerline" panose="020B0509030602030204" pitchFamily="49" charset="0"/>
+              </a:rPr>
+              <a:t>pt</a:t>
+            </a:r>
+            <a:r>
+              <a:rPr lang="ko-KR" altLang="en-US" sz="1100" b="0" dirty="0">
+                <a:solidFill>
+                  <a:srgbClr val="D4D4D4"/>
+                </a:solidFill>
+                <a:effectLst/>
+                <a:latin typeface="ubuntu mono derivative powerline" panose="020B0509030602030204" pitchFamily="49" charset="0"/>
+              </a:rPr>
+              <a:t> </a:t>
+            </a:r>
+            <a:r>
+              <a:rPr lang="en-US" altLang="ko-KR" sz="1100" b="0" dirty="0">
+                <a:solidFill>
+                  <a:srgbClr val="D4D4D4"/>
+                </a:solidFill>
+                <a:effectLst/>
+                <a:latin typeface="ubuntu mono derivative powerline" panose="020B0509030602030204" pitchFamily="49" charset="0"/>
+              </a:rPr>
+              <a:t>= (</a:t>
+            </a:r>
+            <a:r>
+              <a:rPr lang="en-US" altLang="ko-KR" sz="1100" b="0" dirty="0">
+                <a:solidFill>
+                  <a:srgbClr val="9CDCFE"/>
+                </a:solidFill>
+                <a:effectLst/>
+                <a:latin typeface="ubuntu mono derivative powerline" panose="020B0509030602030204" pitchFamily="49" charset="0"/>
+              </a:rPr>
+              <a:t>a</a:t>
+            </a:r>
+            <a:r>
+              <a:rPr lang="ko-KR" altLang="en-US" sz="1100" b="0" dirty="0">
                 <a:solidFill>
                   <a:srgbClr val="D4D4D4"/>
                 </a:solidFill>
@@ -30613,30 +30540,30 @@
                 <a:effectLst/>
                 <a:latin typeface="ubuntu mono derivative powerline" panose="020B0509030602030204" pitchFamily="49" charset="0"/>
               </a:rPr>
+              <a:t>rho</a:t>
+            </a:r>
+            <a:r>
+              <a:rPr lang="en-US" altLang="ko-KR" sz="1100" b="0" dirty="0">
+                <a:solidFill>
+                  <a:srgbClr val="D4D4D4"/>
+                </a:solidFill>
+                <a:effectLst/>
+                <a:latin typeface="ubuntu mono derivative powerline" panose="020B0509030602030204" pitchFamily="49" charset="0"/>
+              </a:rPr>
+              <a:t>, </a:t>
+            </a:r>
+            <a:r>
+              <a:rPr lang="en-US" altLang="ko-KR" sz="1100" b="0" dirty="0">
+                <a:solidFill>
+                  <a:srgbClr val="9CDCFE"/>
+                </a:solidFill>
+                <a:effectLst/>
+                <a:latin typeface="ubuntu mono derivative powerline" panose="020B0509030602030204" pitchFamily="49" charset="0"/>
+              </a:rPr>
               <a:t>b</a:t>
             </a:r>
             <a:r>
-              <a:rPr lang="en-US" altLang="ko-KR" sz="1100" b="0" dirty="0">
-                <a:solidFill>
-                  <a:srgbClr val="D4D4D4"/>
-                </a:solidFill>
-                <a:effectLst/>
-                <a:latin typeface="ubuntu mono derivative powerline" panose="020B0509030602030204" pitchFamily="49" charset="0"/>
-              </a:rPr>
-              <a:t>, </a:t>
-            </a:r>
-            <a:r>
-              <a:rPr lang="en-US" altLang="ko-KR" sz="1100" b="0" dirty="0">
-                <a:solidFill>
-                  <a:srgbClr val="B5CEA8"/>
-                </a:solidFill>
-                <a:effectLst/>
-                <a:latin typeface="ubuntu mono derivative powerline" panose="020B0509030602030204" pitchFamily="49" charset="0"/>
-              </a:rPr>
-              <a:t>1000</a:t>
-            </a:r>
-            <a:r>
-              <a:rPr lang="en-US" altLang="ko-KR" sz="1100" b="0" dirty="0">
+              <a:rPr lang="ko-KR" altLang="en-US" sz="1100" b="0" dirty="0">
                 <a:solidFill>
                   <a:srgbClr val="D4D4D4"/>
                 </a:solidFill>
@@ -30653,7 +30580,7 @@
                 <a:effectLst/>
                 <a:latin typeface="ubuntu mono derivative powerline" panose="020B0509030602030204" pitchFamily="49" charset="0"/>
               </a:rPr>
-              <a:t>a</a:t>
+              <a:t>rho</a:t>
             </a:r>
             <a:r>
               <a:rPr lang="en-US" altLang="ko-KR" sz="1100" b="0" dirty="0">
@@ -30665,8 +30592,15 @@
               </a:rPr>
               <a:t>)</a:t>
             </a:r>
-          </a:p>
-          <a:p>
+            <a:br>
+              <a:rPr lang="en-US" altLang="ko-KR" sz="1100" b="0" dirty="0">
+                <a:solidFill>
+                  <a:srgbClr val="D4D4D4"/>
+                </a:solidFill>
+                <a:effectLst/>
+                <a:latin typeface="ubuntu mono derivative powerline" panose="020B0509030602030204" pitchFamily="49" charset="0"/>
+              </a:rPr>
+            </a:br>
             <a:r>
               <a:rPr lang="en-US" altLang="ko-KR" sz="1100" b="0" dirty="0">
                 <a:solidFill>
@@ -30680,618 +30614,882 @@
             <a:r>
               <a:rPr lang="en-US" altLang="ko-KR" sz="1100" b="0" dirty="0">
                 <a:solidFill>
-                  <a:srgbClr val="9CDCFE"/>
-                </a:solidFill>
-                <a:effectLst/>
-                <a:latin typeface="ubuntu mono derivative powerline" panose="020B0509030602030204" pitchFamily="49" charset="0"/>
-              </a:rPr>
-              <a:t>pt1</a:t>
-            </a:r>
-            <a:r>
-              <a:rPr lang="en-US" altLang="ko-KR" sz="1100" b="0" dirty="0">
-                <a:solidFill>
-                  <a:srgbClr val="D4D4D4"/>
-                </a:solidFill>
-                <a:effectLst/>
-                <a:latin typeface="ubuntu mono derivative powerline" panose="020B0509030602030204" pitchFamily="49" charset="0"/>
-              </a:rPr>
-              <a:t> = </a:t>
-            </a:r>
-            <a:r>
-              <a:rPr lang="en-US" altLang="ko-KR" sz="1100" b="0" dirty="0" err="1">
-                <a:solidFill>
-                  <a:srgbClr val="4EC9B0"/>
-                </a:solidFill>
-                <a:effectLst/>
-                <a:latin typeface="ubuntu mono derivative powerline" panose="020B0509030602030204" pitchFamily="49" charset="0"/>
-              </a:rPr>
-              <a:t>np</a:t>
-            </a:r>
-            <a:r>
-              <a:rPr lang="en-US" altLang="ko-KR" sz="1100" b="0" dirty="0" err="1">
-                <a:solidFill>
-                  <a:srgbClr val="D4D4D4"/>
-                </a:solidFill>
-                <a:effectLst/>
-                <a:latin typeface="ubuntu mono derivative powerline" panose="020B0509030602030204" pitchFamily="49" charset="0"/>
-              </a:rPr>
-              <a:t>.</a:t>
-            </a:r>
-            <a:r>
-              <a:rPr lang="en-US" altLang="ko-KR" sz="1100" b="0" dirty="0" err="1">
-                <a:solidFill>
-                  <a:srgbClr val="9CDCFE"/>
-                </a:solidFill>
-                <a:effectLst/>
-                <a:latin typeface="ubuntu mono derivative powerline" panose="020B0509030602030204" pitchFamily="49" charset="0"/>
-              </a:rPr>
-              <a:t>add</a:t>
-            </a:r>
-            <a:r>
-              <a:rPr lang="en-US" altLang="ko-KR" sz="1100" b="0" dirty="0">
-                <a:solidFill>
-                  <a:srgbClr val="D4D4D4"/>
-                </a:solidFill>
-                <a:effectLst/>
-                <a:latin typeface="ubuntu mono derivative powerline" panose="020B0509030602030204" pitchFamily="49" charset="0"/>
-              </a:rPr>
-              <a:t>(</a:t>
-            </a:r>
-            <a:r>
-              <a:rPr lang="en-US" altLang="ko-KR" sz="1100" b="0" dirty="0" err="1">
-                <a:solidFill>
-                  <a:srgbClr val="9CDCFE"/>
-                </a:solidFill>
-                <a:effectLst/>
-                <a:latin typeface="ubuntu mono derivative powerline" panose="020B0509030602030204" pitchFamily="49" charset="0"/>
-              </a:rPr>
-              <a:t>pt</a:t>
-            </a:r>
-            <a:r>
-              <a:rPr lang="en-US" altLang="ko-KR" sz="1100" b="0" dirty="0">
-                <a:solidFill>
-                  <a:srgbClr val="D4D4D4"/>
-                </a:solidFill>
-                <a:effectLst/>
-                <a:latin typeface="ubuntu mono derivative powerline" panose="020B0509030602030204" pitchFamily="49" charset="0"/>
-              </a:rPr>
-              <a:t>, </a:t>
-            </a:r>
-            <a:r>
-              <a:rPr lang="en-US" altLang="ko-KR" sz="1100" b="0" dirty="0">
-                <a:solidFill>
-                  <a:srgbClr val="9CDCFE"/>
-                </a:solidFill>
-                <a:effectLst/>
-                <a:latin typeface="ubuntu mono derivative powerline" panose="020B0509030602030204" pitchFamily="49" charset="0"/>
-              </a:rPr>
-              <a:t>delta</a:t>
-            </a:r>
-            <a:r>
-              <a:rPr lang="en-US" altLang="ko-KR" sz="1100" b="0" dirty="0">
-                <a:solidFill>
-                  <a:srgbClr val="D4D4D4"/>
-                </a:solidFill>
-                <a:effectLst/>
-                <a:latin typeface="ubuntu mono derivative powerline" panose="020B0509030602030204" pitchFamily="49" charset="0"/>
-              </a:rPr>
-              <a:t>).</a:t>
-            </a:r>
-            <a:r>
-              <a:rPr lang="en-US" altLang="ko-KR" sz="1100" b="0" dirty="0" err="1">
-                <a:solidFill>
-                  <a:srgbClr val="DCDCAA"/>
-                </a:solidFill>
-                <a:effectLst/>
-                <a:latin typeface="ubuntu mono derivative powerline" panose="020B0509030602030204" pitchFamily="49" charset="0"/>
-              </a:rPr>
-              <a:t>astype</a:t>
-            </a:r>
-            <a:r>
-              <a:rPr lang="en-US" altLang="ko-KR" sz="1100" b="0" dirty="0">
-                <a:solidFill>
-                  <a:srgbClr val="D4D4D4"/>
-                </a:solidFill>
-                <a:effectLst/>
-                <a:latin typeface="ubuntu mono derivative powerline" panose="020B0509030602030204" pitchFamily="49" charset="0"/>
-              </a:rPr>
-              <a:t>(</a:t>
-            </a:r>
-            <a:r>
-              <a:rPr lang="en-US" altLang="ko-KR" sz="1100" b="0" dirty="0">
-                <a:solidFill>
-                  <a:srgbClr val="CE9178"/>
-                </a:solidFill>
-                <a:effectLst/>
-                <a:latin typeface="ubuntu mono derivative powerline" panose="020B0509030602030204" pitchFamily="49" charset="0"/>
-              </a:rPr>
-              <a:t>'int'</a:t>
-            </a:r>
-            <a:r>
-              <a:rPr lang="en-US" altLang="ko-KR" sz="1100" b="0" dirty="0">
-                <a:solidFill>
-                  <a:srgbClr val="D4D4D4"/>
-                </a:solidFill>
-                <a:effectLst/>
-                <a:latin typeface="ubuntu mono derivative powerline" panose="020B0509030602030204" pitchFamily="49" charset="0"/>
-              </a:rPr>
-              <a:t>)</a:t>
-            </a:r>
-          </a:p>
-          <a:p>
-            <a:r>
-              <a:rPr lang="en-US" altLang="ko-KR" sz="1100" b="0" dirty="0">
-                <a:solidFill>
-                  <a:srgbClr val="D4D4D4"/>
-                </a:solidFill>
-                <a:effectLst/>
-                <a:latin typeface="ubuntu mono derivative powerline" panose="020B0509030602030204" pitchFamily="49" charset="0"/>
-              </a:rPr>
-              <a:t>        </a:t>
-            </a:r>
-            <a:r>
-              <a:rPr lang="en-US" altLang="ko-KR" sz="1100" b="0" dirty="0">
-                <a:solidFill>
-                  <a:srgbClr val="9CDCFE"/>
-                </a:solidFill>
-                <a:effectLst/>
-                <a:latin typeface="ubuntu mono derivative powerline" panose="020B0509030602030204" pitchFamily="49" charset="0"/>
-              </a:rPr>
-              <a:t>pt2</a:t>
-            </a:r>
-            <a:r>
-              <a:rPr lang="en-US" altLang="ko-KR" sz="1100" b="0" dirty="0">
-                <a:solidFill>
-                  <a:srgbClr val="D4D4D4"/>
-                </a:solidFill>
-                <a:effectLst/>
-                <a:latin typeface="ubuntu mono derivative powerline" panose="020B0509030602030204" pitchFamily="49" charset="0"/>
-              </a:rPr>
-              <a:t> = </a:t>
-            </a:r>
-            <a:r>
-              <a:rPr lang="en-US" altLang="ko-KR" sz="1100" b="0" dirty="0" err="1">
-                <a:solidFill>
-                  <a:srgbClr val="4EC9B0"/>
-                </a:solidFill>
-                <a:effectLst/>
-                <a:latin typeface="ubuntu mono derivative powerline" panose="020B0509030602030204" pitchFamily="49" charset="0"/>
-              </a:rPr>
-              <a:t>np</a:t>
-            </a:r>
-            <a:r>
-              <a:rPr lang="en-US" altLang="ko-KR" sz="1100" b="0" dirty="0" err="1">
-                <a:solidFill>
-                  <a:srgbClr val="D4D4D4"/>
-                </a:solidFill>
-                <a:effectLst/>
-                <a:latin typeface="ubuntu mono derivative powerline" panose="020B0509030602030204" pitchFamily="49" charset="0"/>
-              </a:rPr>
-              <a:t>.</a:t>
-            </a:r>
-            <a:r>
-              <a:rPr lang="en-US" altLang="ko-KR" sz="1100" b="0" dirty="0" err="1">
-                <a:solidFill>
-                  <a:srgbClr val="9CDCFE"/>
-                </a:solidFill>
-                <a:effectLst/>
-                <a:latin typeface="ubuntu mono derivative powerline" panose="020B0509030602030204" pitchFamily="49" charset="0"/>
-              </a:rPr>
-              <a:t>subtract</a:t>
-            </a:r>
-            <a:r>
-              <a:rPr lang="en-US" altLang="ko-KR" sz="1100" b="0" dirty="0">
-                <a:solidFill>
-                  <a:srgbClr val="D4D4D4"/>
-                </a:solidFill>
-                <a:effectLst/>
-                <a:latin typeface="ubuntu mono derivative powerline" panose="020B0509030602030204" pitchFamily="49" charset="0"/>
-              </a:rPr>
-              <a:t>(</a:t>
-            </a:r>
-            <a:r>
-              <a:rPr lang="en-US" altLang="ko-KR" sz="1100" b="0" dirty="0" err="1">
-                <a:solidFill>
-                  <a:srgbClr val="9CDCFE"/>
-                </a:solidFill>
-                <a:effectLst/>
-                <a:latin typeface="ubuntu mono derivative powerline" panose="020B0509030602030204" pitchFamily="49" charset="0"/>
-              </a:rPr>
-              <a:t>pt</a:t>
-            </a:r>
-            <a:r>
-              <a:rPr lang="en-US" altLang="ko-KR" sz="1100" b="0" dirty="0">
-                <a:solidFill>
-                  <a:srgbClr val="D4D4D4"/>
-                </a:solidFill>
-                <a:effectLst/>
-                <a:latin typeface="ubuntu mono derivative powerline" panose="020B0509030602030204" pitchFamily="49" charset="0"/>
-              </a:rPr>
-              <a:t>, </a:t>
-            </a:r>
-            <a:r>
-              <a:rPr lang="en-US" altLang="ko-KR" sz="1100" b="0" dirty="0">
-                <a:solidFill>
-                  <a:srgbClr val="9CDCFE"/>
-                </a:solidFill>
-                <a:effectLst/>
-                <a:latin typeface="ubuntu mono derivative powerline" panose="020B0509030602030204" pitchFamily="49" charset="0"/>
-              </a:rPr>
-              <a:t>delta</a:t>
-            </a:r>
-            <a:r>
-              <a:rPr lang="en-US" altLang="ko-KR" sz="1100" b="0" dirty="0">
-                <a:solidFill>
-                  <a:srgbClr val="D4D4D4"/>
-                </a:solidFill>
-                <a:effectLst/>
-                <a:latin typeface="ubuntu mono derivative powerline" panose="020B0509030602030204" pitchFamily="49" charset="0"/>
-              </a:rPr>
-              <a:t>).</a:t>
-            </a:r>
-            <a:r>
-              <a:rPr lang="en-US" altLang="ko-KR" sz="1100" b="0" dirty="0" err="1">
-                <a:solidFill>
-                  <a:srgbClr val="DCDCAA"/>
-                </a:solidFill>
-                <a:effectLst/>
-                <a:latin typeface="ubuntu mono derivative powerline" panose="020B0509030602030204" pitchFamily="49" charset="0"/>
-              </a:rPr>
-              <a:t>astype</a:t>
-            </a:r>
-            <a:r>
-              <a:rPr lang="en-US" altLang="ko-KR" sz="1100" b="0" dirty="0">
-                <a:solidFill>
-                  <a:srgbClr val="D4D4D4"/>
-                </a:solidFill>
-                <a:effectLst/>
-                <a:latin typeface="ubuntu mono derivative powerline" panose="020B0509030602030204" pitchFamily="49" charset="0"/>
-              </a:rPr>
-              <a:t>(</a:t>
-            </a:r>
-            <a:r>
-              <a:rPr lang="en-US" altLang="ko-KR" sz="1100" b="0" dirty="0">
-                <a:solidFill>
-                  <a:srgbClr val="CE9178"/>
-                </a:solidFill>
-                <a:effectLst/>
-                <a:latin typeface="ubuntu mono derivative powerline" panose="020B0509030602030204" pitchFamily="49" charset="0"/>
-              </a:rPr>
-              <a:t>'int'</a:t>
-            </a:r>
-            <a:r>
-              <a:rPr lang="en-US" altLang="ko-KR" sz="1100" b="0" dirty="0">
-                <a:solidFill>
-                  <a:srgbClr val="D4D4D4"/>
-                </a:solidFill>
-                <a:effectLst/>
-                <a:latin typeface="ubuntu mono derivative powerline" panose="020B0509030602030204" pitchFamily="49" charset="0"/>
-              </a:rPr>
-              <a:t>)</a:t>
-            </a:r>
-          </a:p>
-          <a:p>
-            <a:r>
-              <a:rPr lang="en-US" altLang="ko-KR" sz="1100" b="0" dirty="0">
-                <a:solidFill>
-                  <a:srgbClr val="D4D4D4"/>
-                </a:solidFill>
-                <a:effectLst/>
-                <a:latin typeface="ubuntu mono derivative powerline" panose="020B0509030602030204" pitchFamily="49" charset="0"/>
-              </a:rPr>
-              <a:t>        </a:t>
-            </a:r>
-            <a:r>
-              <a:rPr lang="en-US" altLang="ko-KR" sz="1100" b="0" dirty="0">
-                <a:solidFill>
-                  <a:srgbClr val="4EC9B0"/>
-                </a:solidFill>
-                <a:effectLst/>
-                <a:latin typeface="ubuntu mono derivative powerline" panose="020B0509030602030204" pitchFamily="49" charset="0"/>
-              </a:rPr>
-              <a:t>cv2</a:t>
-            </a:r>
-            <a:r>
-              <a:rPr lang="en-US" altLang="ko-KR" sz="1100" b="0" dirty="0">
-                <a:solidFill>
-                  <a:srgbClr val="D4D4D4"/>
-                </a:solidFill>
-                <a:effectLst/>
-                <a:latin typeface="ubuntu mono derivative powerline" panose="020B0509030602030204" pitchFamily="49" charset="0"/>
-              </a:rPr>
-              <a:t>.</a:t>
-            </a:r>
-            <a:r>
-              <a:rPr lang="en-US" altLang="ko-KR" sz="1100" b="0" dirty="0">
-                <a:solidFill>
-                  <a:srgbClr val="DCDCAA"/>
-                </a:solidFill>
-                <a:effectLst/>
-                <a:latin typeface="ubuntu mono derivative powerline" panose="020B0509030602030204" pitchFamily="49" charset="0"/>
-              </a:rPr>
-              <a:t>line</a:t>
-            </a:r>
-            <a:r>
-              <a:rPr lang="en-US" altLang="ko-KR" sz="1100" b="0" dirty="0">
-                <a:solidFill>
-                  <a:srgbClr val="D4D4D4"/>
-                </a:solidFill>
-                <a:effectLst/>
-                <a:latin typeface="ubuntu mono derivative powerline" panose="020B0509030602030204" pitchFamily="49" charset="0"/>
-              </a:rPr>
-              <a:t>(</a:t>
-            </a:r>
-            <a:r>
-              <a:rPr lang="en-US" altLang="ko-KR" sz="1100" b="0" dirty="0" err="1">
-                <a:solidFill>
-                  <a:srgbClr val="9CDCFE"/>
-                </a:solidFill>
-                <a:effectLst/>
-                <a:latin typeface="ubuntu mono derivative powerline" panose="020B0509030602030204" pitchFamily="49" charset="0"/>
-              </a:rPr>
-              <a:t>dst</a:t>
-            </a:r>
-            <a:r>
-              <a:rPr lang="en-US" altLang="ko-KR" sz="1100" b="0" dirty="0">
-                <a:solidFill>
-                  <a:srgbClr val="D4D4D4"/>
-                </a:solidFill>
-                <a:effectLst/>
-                <a:latin typeface="ubuntu mono derivative powerline" panose="020B0509030602030204" pitchFamily="49" charset="0"/>
-              </a:rPr>
-              <a:t>, </a:t>
-            </a:r>
-            <a:r>
-              <a:rPr lang="en-US" altLang="ko-KR" sz="1100" b="0" dirty="0">
-                <a:solidFill>
-                  <a:srgbClr val="4EC9B0"/>
-                </a:solidFill>
-                <a:effectLst/>
-                <a:latin typeface="ubuntu mono derivative powerline" panose="020B0509030602030204" pitchFamily="49" charset="0"/>
-              </a:rPr>
-              <a:t>tuple</a:t>
-            </a:r>
-            <a:r>
-              <a:rPr lang="en-US" altLang="ko-KR" sz="1100" b="0" dirty="0">
-                <a:solidFill>
-                  <a:srgbClr val="D4D4D4"/>
-                </a:solidFill>
-                <a:effectLst/>
-                <a:latin typeface="ubuntu mono derivative powerline" panose="020B0509030602030204" pitchFamily="49" charset="0"/>
-              </a:rPr>
-              <a:t>(</a:t>
-            </a:r>
-            <a:r>
-              <a:rPr lang="en-US" altLang="ko-KR" sz="1100" b="0" dirty="0">
-                <a:solidFill>
-                  <a:srgbClr val="9CDCFE"/>
-                </a:solidFill>
-                <a:effectLst/>
-                <a:latin typeface="ubuntu mono derivative powerline" panose="020B0509030602030204" pitchFamily="49" charset="0"/>
-              </a:rPr>
-              <a:t>pt1</a:t>
-            </a:r>
-            <a:r>
-              <a:rPr lang="en-US" altLang="ko-KR" sz="1100" b="0" dirty="0">
-                <a:solidFill>
-                  <a:srgbClr val="D4D4D4"/>
-                </a:solidFill>
-                <a:effectLst/>
-                <a:latin typeface="ubuntu mono derivative powerline" panose="020B0509030602030204" pitchFamily="49" charset="0"/>
-              </a:rPr>
-              <a:t>), </a:t>
-            </a:r>
-            <a:r>
-              <a:rPr lang="en-US" altLang="ko-KR" sz="1100" b="0" dirty="0">
-                <a:solidFill>
-                  <a:srgbClr val="4EC9B0"/>
-                </a:solidFill>
-                <a:effectLst/>
-                <a:latin typeface="ubuntu mono derivative powerline" panose="020B0509030602030204" pitchFamily="49" charset="0"/>
-              </a:rPr>
-              <a:t>tuple</a:t>
-            </a:r>
-            <a:r>
-              <a:rPr lang="en-US" altLang="ko-KR" sz="1100" b="0" dirty="0">
-                <a:solidFill>
-                  <a:srgbClr val="D4D4D4"/>
-                </a:solidFill>
-                <a:effectLst/>
-                <a:latin typeface="ubuntu mono derivative powerline" panose="020B0509030602030204" pitchFamily="49" charset="0"/>
-              </a:rPr>
-              <a:t>(</a:t>
-            </a:r>
-            <a:r>
-              <a:rPr lang="en-US" altLang="ko-KR" sz="1100" b="0" dirty="0">
-                <a:solidFill>
-                  <a:srgbClr val="9CDCFE"/>
-                </a:solidFill>
-                <a:effectLst/>
-                <a:latin typeface="ubuntu mono derivative powerline" panose="020B0509030602030204" pitchFamily="49" charset="0"/>
-              </a:rPr>
-              <a:t>pt2</a:t>
-            </a:r>
-            <a:r>
-              <a:rPr lang="en-US" altLang="ko-KR" sz="1100" b="0" dirty="0">
-                <a:solidFill>
-                  <a:srgbClr val="D4D4D4"/>
-                </a:solidFill>
-                <a:effectLst/>
-                <a:latin typeface="ubuntu mono derivative powerline" panose="020B0509030602030204" pitchFamily="49" charset="0"/>
-              </a:rPr>
-              <a:t>), (</a:t>
-            </a:r>
-            <a:r>
-              <a:rPr lang="en-US" altLang="ko-KR" sz="1100" b="0" dirty="0">
-                <a:solidFill>
-                  <a:srgbClr val="B5CEA8"/>
-                </a:solidFill>
-                <a:effectLst/>
-                <a:latin typeface="ubuntu mono derivative powerline" panose="020B0509030602030204" pitchFamily="49" charset="0"/>
-              </a:rPr>
-              <a:t>255</a:t>
-            </a:r>
-            <a:r>
-              <a:rPr lang="en-US" altLang="ko-KR" sz="1100" b="0" dirty="0">
-                <a:solidFill>
-                  <a:srgbClr val="D4D4D4"/>
-                </a:solidFill>
-                <a:effectLst/>
-                <a:latin typeface="ubuntu mono derivative powerline" panose="020B0509030602030204" pitchFamily="49" charset="0"/>
-              </a:rPr>
-              <a:t>, </a:t>
-            </a:r>
-            <a:r>
-              <a:rPr lang="en-US" altLang="ko-KR" sz="1100" b="0" dirty="0">
-                <a:solidFill>
-                  <a:srgbClr val="B5CEA8"/>
-                </a:solidFill>
-                <a:effectLst/>
-                <a:latin typeface="ubuntu mono derivative powerline" panose="020B0509030602030204" pitchFamily="49" charset="0"/>
-              </a:rPr>
-              <a:t>0</a:t>
-            </a:r>
-            <a:r>
-              <a:rPr lang="en-US" altLang="ko-KR" sz="1100" b="0" dirty="0">
-                <a:solidFill>
-                  <a:srgbClr val="D4D4D4"/>
-                </a:solidFill>
-                <a:effectLst/>
-                <a:latin typeface="ubuntu mono derivative powerline" panose="020B0509030602030204" pitchFamily="49" charset="0"/>
-              </a:rPr>
-              <a:t>, </a:t>
-            </a:r>
-            <a:r>
-              <a:rPr lang="en-US" altLang="ko-KR" sz="1100" b="0" dirty="0">
-                <a:solidFill>
-                  <a:srgbClr val="B5CEA8"/>
-                </a:solidFill>
-                <a:effectLst/>
-                <a:latin typeface="ubuntu mono derivative powerline" panose="020B0509030602030204" pitchFamily="49" charset="0"/>
-              </a:rPr>
-              <a:t>0</a:t>
-            </a:r>
-            <a:r>
-              <a:rPr lang="en-US" altLang="ko-KR" sz="1100" b="0" dirty="0">
-                <a:solidFill>
-                  <a:srgbClr val="D4D4D4"/>
-                </a:solidFill>
-                <a:effectLst/>
-                <a:latin typeface="ubuntu mono derivative powerline" panose="020B0509030602030204" pitchFamily="49" charset="0"/>
-              </a:rPr>
-              <a:t>), </a:t>
-            </a:r>
-            <a:r>
-              <a:rPr lang="en-US" altLang="ko-KR" sz="1100" b="0" dirty="0">
-                <a:solidFill>
-                  <a:srgbClr val="B5CEA8"/>
-                </a:solidFill>
-                <a:effectLst/>
-                <a:latin typeface="ubuntu mono derivative powerline" panose="020B0509030602030204" pitchFamily="49" charset="0"/>
-              </a:rPr>
-              <a:t>2</a:t>
-            </a:r>
-            <a:r>
-              <a:rPr lang="en-US" altLang="ko-KR" sz="1100" b="0" dirty="0">
-                <a:solidFill>
-                  <a:srgbClr val="D4D4D4"/>
-                </a:solidFill>
-                <a:effectLst/>
-                <a:latin typeface="ubuntu mono derivative powerline" panose="020B0509030602030204" pitchFamily="49" charset="0"/>
-              </a:rPr>
-              <a:t>, </a:t>
-            </a:r>
-            <a:r>
-              <a:rPr lang="en-US" altLang="ko-KR" sz="1100" b="0" dirty="0">
-                <a:solidFill>
-                  <a:srgbClr val="4EC9B0"/>
-                </a:solidFill>
-                <a:effectLst/>
-                <a:latin typeface="ubuntu mono derivative powerline" panose="020B0509030602030204" pitchFamily="49" charset="0"/>
-              </a:rPr>
-              <a:t>cv2</a:t>
-            </a:r>
-            <a:r>
-              <a:rPr lang="en-US" altLang="ko-KR" sz="1100" b="0" dirty="0">
-                <a:solidFill>
-                  <a:srgbClr val="D4D4D4"/>
-                </a:solidFill>
-                <a:effectLst/>
-                <a:latin typeface="ubuntu mono derivative powerline" panose="020B0509030602030204" pitchFamily="49" charset="0"/>
-              </a:rPr>
-              <a:t>.</a:t>
-            </a:r>
-            <a:r>
-              <a:rPr lang="en-US" altLang="ko-KR" sz="1100" b="0" dirty="0">
-                <a:solidFill>
-                  <a:srgbClr val="9CDCFE"/>
-                </a:solidFill>
-                <a:effectLst/>
-                <a:latin typeface="ubuntu mono derivative powerline" panose="020B0509030602030204" pitchFamily="49" charset="0"/>
-              </a:rPr>
-              <a:t>LINE_AA</a:t>
-            </a:r>
-            <a:r>
-              <a:rPr lang="en-US" altLang="ko-KR" sz="1100" b="0" dirty="0">
-                <a:solidFill>
-                  <a:srgbClr val="D4D4D4"/>
-                </a:solidFill>
-                <a:effectLst/>
-                <a:latin typeface="ubuntu mono derivative powerline" panose="020B0509030602030204" pitchFamily="49" charset="0"/>
-              </a:rPr>
-              <a:t>)</a:t>
-            </a:r>
-          </a:p>
-          <a:p>
-            <a:r>
-              <a:rPr lang="en-US" altLang="ko-KR" sz="1100" b="0" dirty="0">
-                <a:solidFill>
-                  <a:srgbClr val="D4D4D4"/>
-                </a:solidFill>
-                <a:effectLst/>
-                <a:latin typeface="ubuntu mono derivative powerline" panose="020B0509030602030204" pitchFamily="49" charset="0"/>
-              </a:rPr>
-              <a:t>    </a:t>
-            </a:r>
-            <a:r>
-              <a:rPr lang="en-US" altLang="ko-KR" sz="1100" b="0" dirty="0">
-                <a:solidFill>
-                  <a:srgbClr val="C586C0"/>
-                </a:solidFill>
-                <a:effectLst/>
-                <a:latin typeface="ubuntu mono derivative powerline" panose="020B0509030602030204" pitchFamily="49" charset="0"/>
-              </a:rPr>
-              <a:t>return</a:t>
-            </a:r>
-            <a:r>
-              <a:rPr lang="en-US" altLang="ko-KR" sz="1100" b="0" dirty="0">
-                <a:solidFill>
-                  <a:srgbClr val="D4D4D4"/>
-                </a:solidFill>
-                <a:effectLst/>
-                <a:latin typeface="ubuntu mono derivative powerline" panose="020B0509030602030204" pitchFamily="49" charset="0"/>
-              </a:rPr>
-              <a:t> </a:t>
-            </a:r>
-            <a:r>
-              <a:rPr lang="en-US" altLang="ko-KR" sz="1100" b="0" dirty="0" err="1">
-                <a:solidFill>
-                  <a:srgbClr val="9CDCFE"/>
-                </a:solidFill>
-                <a:effectLst/>
-                <a:latin typeface="ubuntu mono derivative powerline" panose="020B0509030602030204" pitchFamily="49" charset="0"/>
-              </a:rPr>
-              <a:t>dst</a:t>
-            </a:r>
-            <a:endParaRPr lang="en-US" altLang="ko-KR" sz="1100" b="0" dirty="0">
+                  <a:srgbClr val="6A9955"/>
+                </a:solidFill>
+                <a:effectLst/>
+                <a:latin typeface="ubuntu mono derivative powerline" panose="020B0509030602030204" pitchFamily="49" charset="0"/>
+              </a:rPr>
+              <a:t># </a:t>
+            </a:r>
+            <a:r>
+              <a:rPr lang="ko-KR" altLang="en-US" sz="1100" b="0" dirty="0">
+                <a:solidFill>
+                  <a:srgbClr val="6A9955"/>
+                </a:solidFill>
+                <a:effectLst/>
+                <a:latin typeface="ubuntu mono derivative powerline" panose="020B0509030602030204" pitchFamily="49" charset="0"/>
+              </a:rPr>
+              <a:t>직선상의 이동 위치</a:t>
+            </a:r>
+            <a:endParaRPr lang="ko-KR" altLang="en-US" sz="1100" b="0" dirty="0">
               <a:solidFill>
-                <a:srgbClr val="9CDCFE"/>
+                <a:srgbClr val="D4D4D4"/>
               </a:solidFill>
               <a:effectLst/>
               <a:latin typeface="ubuntu mono derivative powerline" panose="020B0509030602030204" pitchFamily="49" charset="0"/>
             </a:endParaRPr>
           </a:p>
           <a:p>
+            <a:r>
+              <a:rPr lang="ko-KR" altLang="en-US" sz="1100" b="0" dirty="0">
+                <a:solidFill>
+                  <a:srgbClr val="D4D4D4"/>
+                </a:solidFill>
+                <a:effectLst/>
+                <a:latin typeface="ubuntu mono derivative powerline" panose="020B0509030602030204" pitchFamily="49" charset="0"/>
+              </a:rPr>
+              <a:t>        </a:t>
+            </a:r>
+            <a:r>
+              <a:rPr lang="en-US" altLang="ko-KR" sz="1100" b="0" dirty="0">
+                <a:solidFill>
+                  <a:srgbClr val="9CDCFE"/>
+                </a:solidFill>
+                <a:effectLst/>
+                <a:latin typeface="ubuntu mono derivative powerline" panose="020B0509030602030204" pitchFamily="49" charset="0"/>
+              </a:rPr>
+              <a:t>delta</a:t>
+            </a:r>
+            <a:r>
+              <a:rPr lang="ko-KR" altLang="en-US" sz="1100" b="0" dirty="0">
+                <a:solidFill>
+                  <a:srgbClr val="D4D4D4"/>
+                </a:solidFill>
+                <a:effectLst/>
+                <a:latin typeface="ubuntu mono derivative powerline" panose="020B0509030602030204" pitchFamily="49" charset="0"/>
+              </a:rPr>
+              <a:t> </a:t>
+            </a:r>
+            <a:r>
+              <a:rPr lang="en-US" altLang="ko-KR" sz="1100" b="0" dirty="0">
+                <a:solidFill>
+                  <a:srgbClr val="D4D4D4"/>
+                </a:solidFill>
+                <a:effectLst/>
+                <a:latin typeface="ubuntu mono derivative powerline" panose="020B0509030602030204" pitchFamily="49" charset="0"/>
+              </a:rPr>
+              <a:t>= (-</a:t>
+            </a:r>
+            <a:r>
+              <a:rPr lang="en-US" altLang="ko-KR" sz="1100" b="0" dirty="0">
+                <a:solidFill>
+                  <a:srgbClr val="B5CEA8"/>
+                </a:solidFill>
+                <a:effectLst/>
+                <a:latin typeface="ubuntu mono derivative powerline" panose="020B0509030602030204" pitchFamily="49" charset="0"/>
+              </a:rPr>
+              <a:t>1000</a:t>
+            </a:r>
+            <a:r>
+              <a:rPr lang="ko-KR" altLang="en-US" sz="1100" b="0" dirty="0">
+                <a:solidFill>
+                  <a:srgbClr val="D4D4D4"/>
+                </a:solidFill>
+                <a:effectLst/>
+                <a:latin typeface="ubuntu mono derivative powerline" panose="020B0509030602030204" pitchFamily="49" charset="0"/>
+              </a:rPr>
+              <a:t> * </a:t>
+            </a:r>
+            <a:r>
+              <a:rPr lang="en-US" altLang="ko-KR" sz="1100" b="0" dirty="0">
+                <a:solidFill>
+                  <a:srgbClr val="9CDCFE"/>
+                </a:solidFill>
+                <a:effectLst/>
+                <a:latin typeface="ubuntu mono derivative powerline" panose="020B0509030602030204" pitchFamily="49" charset="0"/>
+              </a:rPr>
+              <a:t>b</a:t>
+            </a:r>
+            <a:r>
+              <a:rPr lang="en-US" altLang="ko-KR" sz="1100" b="0" dirty="0">
+                <a:solidFill>
+                  <a:srgbClr val="D4D4D4"/>
+                </a:solidFill>
+                <a:effectLst/>
+                <a:latin typeface="ubuntu mono derivative powerline" panose="020B0509030602030204" pitchFamily="49" charset="0"/>
+              </a:rPr>
+              <a:t>, </a:t>
+            </a:r>
+            <a:r>
+              <a:rPr lang="en-US" altLang="ko-KR" sz="1100" b="0" dirty="0">
+                <a:solidFill>
+                  <a:srgbClr val="B5CEA8"/>
+                </a:solidFill>
+                <a:effectLst/>
+                <a:latin typeface="ubuntu mono derivative powerline" panose="020B0509030602030204" pitchFamily="49" charset="0"/>
+              </a:rPr>
+              <a:t>1000</a:t>
+            </a:r>
+            <a:r>
+              <a:rPr lang="ko-KR" altLang="en-US" sz="1100" b="0" dirty="0">
+                <a:solidFill>
+                  <a:srgbClr val="D4D4D4"/>
+                </a:solidFill>
+                <a:effectLst/>
+                <a:latin typeface="ubuntu mono derivative powerline" panose="020B0509030602030204" pitchFamily="49" charset="0"/>
+              </a:rPr>
+              <a:t> * </a:t>
+            </a:r>
+            <a:r>
+              <a:rPr lang="en-US" altLang="ko-KR" sz="1100" b="0" dirty="0">
+                <a:solidFill>
+                  <a:srgbClr val="9CDCFE"/>
+                </a:solidFill>
+                <a:effectLst/>
+                <a:latin typeface="ubuntu mono derivative powerline" panose="020B0509030602030204" pitchFamily="49" charset="0"/>
+              </a:rPr>
+              <a:t>a</a:t>
+            </a:r>
+            <a:r>
+              <a:rPr lang="en-US" altLang="ko-KR" sz="1100" b="0" dirty="0">
+                <a:solidFill>
+                  <a:srgbClr val="D4D4D4"/>
+                </a:solidFill>
+                <a:effectLst/>
+                <a:latin typeface="ubuntu mono derivative powerline" panose="020B0509030602030204" pitchFamily="49" charset="0"/>
+              </a:rPr>
+              <a:t>)</a:t>
+            </a:r>
+            <a:br>
+              <a:rPr lang="en-US" altLang="ko-KR" sz="1100" b="0" dirty="0">
+                <a:solidFill>
+                  <a:srgbClr val="D4D4D4"/>
+                </a:solidFill>
+                <a:effectLst/>
+                <a:latin typeface="ubuntu mono derivative powerline" panose="020B0509030602030204" pitchFamily="49" charset="0"/>
+              </a:rPr>
+            </a:br>
+            <a:r>
+              <a:rPr lang="en-US" altLang="ko-KR" sz="1100" b="0" dirty="0">
+                <a:solidFill>
+                  <a:srgbClr val="D4D4D4"/>
+                </a:solidFill>
+                <a:effectLst/>
+                <a:latin typeface="ubuntu mono derivative powerline" panose="020B0509030602030204" pitchFamily="49" charset="0"/>
+              </a:rPr>
+              <a:t>        </a:t>
+            </a:r>
+            <a:r>
+              <a:rPr lang="en-US" altLang="ko-KR" sz="1100" b="0" dirty="0">
+                <a:solidFill>
+                  <a:srgbClr val="6A9955"/>
+                </a:solidFill>
+                <a:effectLst/>
+                <a:latin typeface="ubuntu mono derivative powerline" panose="020B0509030602030204" pitchFamily="49" charset="0"/>
+              </a:rPr>
+              <a:t># </a:t>
+            </a:r>
+            <a:r>
+              <a:rPr lang="ko-KR" altLang="en-US" sz="1100" b="0" dirty="0">
+                <a:solidFill>
+                  <a:srgbClr val="6A9955"/>
+                </a:solidFill>
+                <a:effectLst/>
+                <a:latin typeface="ubuntu mono derivative powerline" panose="020B0509030602030204" pitchFamily="49" charset="0"/>
+              </a:rPr>
+              <a:t>직선의 방정식으로 그리기 위한 시작점 계산</a:t>
+            </a:r>
+            <a:endParaRPr lang="ko-KR" altLang="en-US" sz="1100" b="0" dirty="0">
+              <a:solidFill>
+                <a:srgbClr val="D4D4D4"/>
+              </a:solidFill>
+              <a:effectLst/>
+              <a:latin typeface="ubuntu mono derivative powerline" panose="020B0509030602030204" pitchFamily="49" charset="0"/>
+            </a:endParaRPr>
+          </a:p>
+          <a:p>
+            <a:r>
+              <a:rPr lang="ko-KR" altLang="en-US" sz="1100" b="0" dirty="0">
+                <a:solidFill>
+                  <a:srgbClr val="D4D4D4"/>
+                </a:solidFill>
+                <a:effectLst/>
+                <a:latin typeface="ubuntu mono derivative powerline" panose="020B0509030602030204" pitchFamily="49" charset="0"/>
+              </a:rPr>
+              <a:t>        </a:t>
+            </a:r>
+            <a:r>
+              <a:rPr lang="en-US" altLang="ko-KR" sz="1100" b="0" dirty="0">
+                <a:solidFill>
+                  <a:srgbClr val="9CDCFE"/>
+                </a:solidFill>
+                <a:effectLst/>
+                <a:latin typeface="ubuntu mono derivative powerline" panose="020B0509030602030204" pitchFamily="49" charset="0"/>
+              </a:rPr>
+              <a:t>pt1</a:t>
+            </a:r>
+            <a:r>
+              <a:rPr lang="ko-KR" altLang="en-US" sz="1100" b="0" dirty="0">
+                <a:solidFill>
+                  <a:srgbClr val="D4D4D4"/>
+                </a:solidFill>
+                <a:effectLst/>
+                <a:latin typeface="ubuntu mono derivative powerline" panose="020B0509030602030204" pitchFamily="49" charset="0"/>
+              </a:rPr>
+              <a:t> </a:t>
+            </a:r>
+            <a:r>
+              <a:rPr lang="en-US" altLang="ko-KR" sz="1100" b="0" dirty="0">
+                <a:solidFill>
+                  <a:srgbClr val="D4D4D4"/>
+                </a:solidFill>
+                <a:effectLst/>
+                <a:latin typeface="ubuntu mono derivative powerline" panose="020B0509030602030204" pitchFamily="49" charset="0"/>
+              </a:rPr>
+              <a:t>= </a:t>
+            </a:r>
+            <a:r>
+              <a:rPr lang="en-US" altLang="ko-KR" sz="1100" b="0" dirty="0" err="1">
+                <a:solidFill>
+                  <a:srgbClr val="4EC9B0"/>
+                </a:solidFill>
+                <a:effectLst/>
+                <a:latin typeface="ubuntu mono derivative powerline" panose="020B0509030602030204" pitchFamily="49" charset="0"/>
+              </a:rPr>
+              <a:t>np</a:t>
+            </a:r>
+            <a:r>
+              <a:rPr lang="en-US" altLang="ko-KR" sz="1100" b="0" dirty="0" err="1">
+                <a:solidFill>
+                  <a:srgbClr val="D4D4D4"/>
+                </a:solidFill>
+                <a:effectLst/>
+                <a:latin typeface="ubuntu mono derivative powerline" panose="020B0509030602030204" pitchFamily="49" charset="0"/>
+              </a:rPr>
+              <a:t>.</a:t>
+            </a:r>
+            <a:r>
+              <a:rPr lang="en-US" altLang="ko-KR" sz="1100" b="0" dirty="0" err="1">
+                <a:solidFill>
+                  <a:srgbClr val="9CDCFE"/>
+                </a:solidFill>
+                <a:effectLst/>
+                <a:latin typeface="ubuntu mono derivative powerline" panose="020B0509030602030204" pitchFamily="49" charset="0"/>
+              </a:rPr>
+              <a:t>add</a:t>
+            </a:r>
+            <a:r>
+              <a:rPr lang="en-US" altLang="ko-KR" sz="1100" b="0" dirty="0">
+                <a:solidFill>
+                  <a:srgbClr val="D4D4D4"/>
+                </a:solidFill>
+                <a:effectLst/>
+                <a:latin typeface="ubuntu mono derivative powerline" panose="020B0509030602030204" pitchFamily="49" charset="0"/>
+              </a:rPr>
+              <a:t>(</a:t>
+            </a:r>
+            <a:r>
+              <a:rPr lang="en-US" altLang="ko-KR" sz="1100" b="0" dirty="0" err="1">
+                <a:solidFill>
+                  <a:srgbClr val="9CDCFE"/>
+                </a:solidFill>
+                <a:effectLst/>
+                <a:latin typeface="ubuntu mono derivative powerline" panose="020B0509030602030204" pitchFamily="49" charset="0"/>
+              </a:rPr>
+              <a:t>pt</a:t>
+            </a:r>
+            <a:r>
+              <a:rPr lang="en-US" altLang="ko-KR" sz="1100" b="0" dirty="0">
+                <a:solidFill>
+                  <a:srgbClr val="D4D4D4"/>
+                </a:solidFill>
+                <a:effectLst/>
+                <a:latin typeface="ubuntu mono derivative powerline" panose="020B0509030602030204" pitchFamily="49" charset="0"/>
+              </a:rPr>
+              <a:t>, </a:t>
+            </a:r>
+            <a:r>
+              <a:rPr lang="en-US" altLang="ko-KR" sz="1100" b="0" dirty="0">
+                <a:solidFill>
+                  <a:srgbClr val="9CDCFE"/>
+                </a:solidFill>
+                <a:effectLst/>
+                <a:latin typeface="ubuntu mono derivative powerline" panose="020B0509030602030204" pitchFamily="49" charset="0"/>
+              </a:rPr>
+              <a:t>delta</a:t>
+            </a:r>
+            <a:r>
+              <a:rPr lang="en-US" altLang="ko-KR" sz="1100" b="0" dirty="0">
+                <a:solidFill>
+                  <a:srgbClr val="D4D4D4"/>
+                </a:solidFill>
+                <a:effectLst/>
+                <a:latin typeface="ubuntu mono derivative powerline" panose="020B0509030602030204" pitchFamily="49" charset="0"/>
+              </a:rPr>
+              <a:t>).</a:t>
+            </a:r>
+            <a:r>
+              <a:rPr lang="en-US" altLang="ko-KR" sz="1100" b="0" dirty="0" err="1">
+                <a:solidFill>
+                  <a:srgbClr val="DCDCAA"/>
+                </a:solidFill>
+                <a:effectLst/>
+                <a:latin typeface="ubuntu mono derivative powerline" panose="020B0509030602030204" pitchFamily="49" charset="0"/>
+              </a:rPr>
+              <a:t>astype</a:t>
+            </a:r>
+            <a:r>
+              <a:rPr lang="en-US" altLang="ko-KR" sz="1100" b="0" dirty="0">
+                <a:solidFill>
+                  <a:srgbClr val="D4D4D4"/>
+                </a:solidFill>
+                <a:effectLst/>
+                <a:latin typeface="ubuntu mono derivative powerline" panose="020B0509030602030204" pitchFamily="49" charset="0"/>
+              </a:rPr>
+              <a:t>(</a:t>
+            </a:r>
+            <a:r>
+              <a:rPr lang="en-US" altLang="ko-KR" sz="1100" b="0" dirty="0">
+                <a:solidFill>
+                  <a:srgbClr val="CE9178"/>
+                </a:solidFill>
+                <a:effectLst/>
+                <a:latin typeface="ubuntu mono derivative powerline" panose="020B0509030602030204" pitchFamily="49" charset="0"/>
+              </a:rPr>
+              <a:t>'int'</a:t>
+            </a:r>
+            <a:r>
+              <a:rPr lang="en-US" altLang="ko-KR" sz="1100" b="0" dirty="0">
+                <a:solidFill>
+                  <a:srgbClr val="D4D4D4"/>
+                </a:solidFill>
+                <a:effectLst/>
+                <a:latin typeface="ubuntu mono derivative powerline" panose="020B0509030602030204" pitchFamily="49" charset="0"/>
+              </a:rPr>
+              <a:t>)</a:t>
+            </a:r>
+            <a:br>
+              <a:rPr lang="en-US" altLang="ko-KR" sz="1100" b="0" dirty="0">
+                <a:solidFill>
+                  <a:srgbClr val="D4D4D4"/>
+                </a:solidFill>
+                <a:effectLst/>
+                <a:latin typeface="ubuntu mono derivative powerline" panose="020B0509030602030204" pitchFamily="49" charset="0"/>
+              </a:rPr>
+            </a:br>
+            <a:r>
+              <a:rPr lang="en-US" altLang="ko-KR" sz="1100" b="0" dirty="0">
+                <a:solidFill>
+                  <a:srgbClr val="D4D4D4"/>
+                </a:solidFill>
+                <a:effectLst/>
+                <a:latin typeface="ubuntu mono derivative powerline" panose="020B0509030602030204" pitchFamily="49" charset="0"/>
+              </a:rPr>
+              <a:t>        </a:t>
+            </a:r>
+            <a:r>
+              <a:rPr lang="en-US" altLang="ko-KR" sz="1100" b="0" dirty="0">
+                <a:solidFill>
+                  <a:srgbClr val="6A9955"/>
+                </a:solidFill>
+                <a:effectLst/>
+                <a:latin typeface="ubuntu mono derivative powerline" panose="020B0509030602030204" pitchFamily="49" charset="0"/>
+              </a:rPr>
+              <a:t># </a:t>
+            </a:r>
+            <a:r>
+              <a:rPr lang="ko-KR" altLang="en-US" sz="1100" b="0" dirty="0">
+                <a:solidFill>
+                  <a:srgbClr val="6A9955"/>
+                </a:solidFill>
+                <a:effectLst/>
+                <a:latin typeface="ubuntu mono derivative powerline" panose="020B0509030602030204" pitchFamily="49" charset="0"/>
+              </a:rPr>
+              <a:t>직선의 방정식으로 그리기 위한 끝점 계산</a:t>
+            </a:r>
+            <a:endParaRPr lang="ko-KR" altLang="en-US" sz="1100" b="0" dirty="0">
+              <a:solidFill>
+                <a:srgbClr val="D4D4D4"/>
+              </a:solidFill>
+              <a:effectLst/>
+              <a:latin typeface="ubuntu mono derivative powerline" panose="020B0509030602030204" pitchFamily="49" charset="0"/>
+            </a:endParaRPr>
+          </a:p>
+          <a:p>
+            <a:r>
+              <a:rPr lang="ko-KR" altLang="en-US" sz="1100" b="0" dirty="0">
+                <a:solidFill>
+                  <a:srgbClr val="D4D4D4"/>
+                </a:solidFill>
+                <a:effectLst/>
+                <a:latin typeface="ubuntu mono derivative powerline" panose="020B0509030602030204" pitchFamily="49" charset="0"/>
+              </a:rPr>
+              <a:t>        </a:t>
+            </a:r>
+            <a:r>
+              <a:rPr lang="en-US" altLang="ko-KR" sz="1100" b="0" dirty="0">
+                <a:solidFill>
+                  <a:srgbClr val="9CDCFE"/>
+                </a:solidFill>
+                <a:effectLst/>
+                <a:latin typeface="ubuntu mono derivative powerline" panose="020B0509030602030204" pitchFamily="49" charset="0"/>
+              </a:rPr>
+              <a:t>pt2</a:t>
+            </a:r>
+            <a:r>
+              <a:rPr lang="ko-KR" altLang="en-US" sz="1100" b="0" dirty="0">
+                <a:solidFill>
+                  <a:srgbClr val="D4D4D4"/>
+                </a:solidFill>
+                <a:effectLst/>
+                <a:latin typeface="ubuntu mono derivative powerline" panose="020B0509030602030204" pitchFamily="49" charset="0"/>
+              </a:rPr>
+              <a:t> </a:t>
+            </a:r>
+            <a:r>
+              <a:rPr lang="en-US" altLang="ko-KR" sz="1100" b="0" dirty="0">
+                <a:solidFill>
+                  <a:srgbClr val="D4D4D4"/>
+                </a:solidFill>
+                <a:effectLst/>
+                <a:latin typeface="ubuntu mono derivative powerline" panose="020B0509030602030204" pitchFamily="49" charset="0"/>
+              </a:rPr>
+              <a:t>= </a:t>
+            </a:r>
+            <a:r>
+              <a:rPr lang="en-US" altLang="ko-KR" sz="1100" b="0" dirty="0" err="1">
+                <a:solidFill>
+                  <a:srgbClr val="4EC9B0"/>
+                </a:solidFill>
+                <a:effectLst/>
+                <a:latin typeface="ubuntu mono derivative powerline" panose="020B0509030602030204" pitchFamily="49" charset="0"/>
+              </a:rPr>
+              <a:t>np</a:t>
+            </a:r>
+            <a:r>
+              <a:rPr lang="en-US" altLang="ko-KR" sz="1100" b="0" dirty="0" err="1">
+                <a:solidFill>
+                  <a:srgbClr val="D4D4D4"/>
+                </a:solidFill>
+                <a:effectLst/>
+                <a:latin typeface="ubuntu mono derivative powerline" panose="020B0509030602030204" pitchFamily="49" charset="0"/>
+              </a:rPr>
+              <a:t>.</a:t>
+            </a:r>
+            <a:r>
+              <a:rPr lang="en-US" altLang="ko-KR" sz="1100" b="0" dirty="0" err="1">
+                <a:solidFill>
+                  <a:srgbClr val="9CDCFE"/>
+                </a:solidFill>
+                <a:effectLst/>
+                <a:latin typeface="ubuntu mono derivative powerline" panose="020B0509030602030204" pitchFamily="49" charset="0"/>
+              </a:rPr>
+              <a:t>subtract</a:t>
+            </a:r>
+            <a:r>
+              <a:rPr lang="en-US" altLang="ko-KR" sz="1100" b="0" dirty="0">
+                <a:solidFill>
+                  <a:srgbClr val="D4D4D4"/>
+                </a:solidFill>
+                <a:effectLst/>
+                <a:latin typeface="ubuntu mono derivative powerline" panose="020B0509030602030204" pitchFamily="49" charset="0"/>
+              </a:rPr>
+              <a:t>(</a:t>
+            </a:r>
+            <a:r>
+              <a:rPr lang="en-US" altLang="ko-KR" sz="1100" b="0" dirty="0" err="1">
+                <a:solidFill>
+                  <a:srgbClr val="9CDCFE"/>
+                </a:solidFill>
+                <a:effectLst/>
+                <a:latin typeface="ubuntu mono derivative powerline" panose="020B0509030602030204" pitchFamily="49" charset="0"/>
+              </a:rPr>
+              <a:t>pt</a:t>
+            </a:r>
+            <a:r>
+              <a:rPr lang="en-US" altLang="ko-KR" sz="1100" b="0" dirty="0">
+                <a:solidFill>
+                  <a:srgbClr val="D4D4D4"/>
+                </a:solidFill>
+                <a:effectLst/>
+                <a:latin typeface="ubuntu mono derivative powerline" panose="020B0509030602030204" pitchFamily="49" charset="0"/>
+              </a:rPr>
+              <a:t>, </a:t>
+            </a:r>
+            <a:r>
+              <a:rPr lang="en-US" altLang="ko-KR" sz="1100" b="0" dirty="0">
+                <a:solidFill>
+                  <a:srgbClr val="9CDCFE"/>
+                </a:solidFill>
+                <a:effectLst/>
+                <a:latin typeface="ubuntu mono derivative powerline" panose="020B0509030602030204" pitchFamily="49" charset="0"/>
+              </a:rPr>
+              <a:t>delta</a:t>
+            </a:r>
+            <a:r>
+              <a:rPr lang="en-US" altLang="ko-KR" sz="1100" b="0" dirty="0">
+                <a:solidFill>
+                  <a:srgbClr val="D4D4D4"/>
+                </a:solidFill>
+                <a:effectLst/>
+                <a:latin typeface="ubuntu mono derivative powerline" panose="020B0509030602030204" pitchFamily="49" charset="0"/>
+              </a:rPr>
+              <a:t>).</a:t>
+            </a:r>
+            <a:r>
+              <a:rPr lang="en-US" altLang="ko-KR" sz="1100" b="0" dirty="0" err="1">
+                <a:solidFill>
+                  <a:srgbClr val="DCDCAA"/>
+                </a:solidFill>
+                <a:effectLst/>
+                <a:latin typeface="ubuntu mono derivative powerline" panose="020B0509030602030204" pitchFamily="49" charset="0"/>
+              </a:rPr>
+              <a:t>astype</a:t>
+            </a:r>
+            <a:r>
+              <a:rPr lang="en-US" altLang="ko-KR" sz="1100" b="0" dirty="0">
+                <a:solidFill>
+                  <a:srgbClr val="D4D4D4"/>
+                </a:solidFill>
+                <a:effectLst/>
+                <a:latin typeface="ubuntu mono derivative powerline" panose="020B0509030602030204" pitchFamily="49" charset="0"/>
+              </a:rPr>
+              <a:t>(</a:t>
+            </a:r>
+            <a:r>
+              <a:rPr lang="en-US" altLang="ko-KR" sz="1100" b="0" dirty="0">
+                <a:solidFill>
+                  <a:srgbClr val="CE9178"/>
+                </a:solidFill>
+                <a:effectLst/>
+                <a:latin typeface="ubuntu mono derivative powerline" panose="020B0509030602030204" pitchFamily="49" charset="0"/>
+              </a:rPr>
+              <a:t>'int'</a:t>
+            </a:r>
+            <a:r>
+              <a:rPr lang="en-US" altLang="ko-KR" sz="1100" b="0" dirty="0">
+                <a:solidFill>
+                  <a:srgbClr val="D4D4D4"/>
+                </a:solidFill>
+                <a:effectLst/>
+                <a:latin typeface="ubuntu mono derivative powerline" panose="020B0509030602030204" pitchFamily="49" charset="0"/>
+              </a:rPr>
+              <a:t>)</a:t>
+            </a:r>
+          </a:p>
+          <a:p>
+            <a:r>
+              <a:rPr lang="en-US" altLang="ko-KR" sz="1100" b="0" dirty="0">
+                <a:solidFill>
+                  <a:srgbClr val="D4D4D4"/>
+                </a:solidFill>
+                <a:effectLst/>
+                <a:latin typeface="ubuntu mono derivative powerline" panose="020B0509030602030204" pitchFamily="49" charset="0"/>
+              </a:rPr>
+              <a:t>        </a:t>
+            </a:r>
+            <a:r>
+              <a:rPr lang="en-US" altLang="ko-KR" sz="1100" b="0" dirty="0">
+                <a:solidFill>
+                  <a:srgbClr val="4EC9B0"/>
+                </a:solidFill>
+                <a:effectLst/>
+                <a:latin typeface="ubuntu mono derivative powerline" panose="020B0509030602030204" pitchFamily="49" charset="0"/>
+              </a:rPr>
+              <a:t>cv2</a:t>
+            </a:r>
+            <a:r>
+              <a:rPr lang="en-US" altLang="ko-KR" sz="1100" b="0" dirty="0">
+                <a:solidFill>
+                  <a:srgbClr val="D4D4D4"/>
+                </a:solidFill>
+                <a:effectLst/>
+                <a:latin typeface="ubuntu mono derivative powerline" panose="020B0509030602030204" pitchFamily="49" charset="0"/>
+              </a:rPr>
+              <a:t>.</a:t>
+            </a:r>
+            <a:r>
+              <a:rPr lang="en-US" altLang="ko-KR" sz="1100" b="0" dirty="0">
+                <a:solidFill>
+                  <a:srgbClr val="DCDCAA"/>
+                </a:solidFill>
+                <a:effectLst/>
+                <a:latin typeface="ubuntu mono derivative powerline" panose="020B0509030602030204" pitchFamily="49" charset="0"/>
+              </a:rPr>
+              <a:t>line</a:t>
+            </a:r>
+            <a:r>
+              <a:rPr lang="en-US" altLang="ko-KR" sz="1100" b="0" dirty="0">
+                <a:solidFill>
+                  <a:srgbClr val="D4D4D4"/>
+                </a:solidFill>
+                <a:effectLst/>
+                <a:latin typeface="ubuntu mono derivative powerline" panose="020B0509030602030204" pitchFamily="49" charset="0"/>
+              </a:rPr>
+              <a:t>(</a:t>
+            </a:r>
+            <a:r>
+              <a:rPr lang="en-US" altLang="ko-KR" sz="1100" b="0" dirty="0" err="1">
+                <a:solidFill>
+                  <a:srgbClr val="9CDCFE"/>
+                </a:solidFill>
+                <a:effectLst/>
+                <a:latin typeface="ubuntu mono derivative powerline" panose="020B0509030602030204" pitchFamily="49" charset="0"/>
+              </a:rPr>
+              <a:t>dst</a:t>
+            </a:r>
+            <a:r>
+              <a:rPr lang="en-US" altLang="ko-KR" sz="1100" b="0" dirty="0">
+                <a:solidFill>
+                  <a:srgbClr val="D4D4D4"/>
+                </a:solidFill>
+                <a:effectLst/>
+                <a:latin typeface="ubuntu mono derivative powerline" panose="020B0509030602030204" pitchFamily="49" charset="0"/>
+              </a:rPr>
+              <a:t>, </a:t>
+            </a:r>
+            <a:r>
+              <a:rPr lang="en-US" altLang="ko-KR" sz="1100" b="0" dirty="0">
+                <a:solidFill>
+                  <a:srgbClr val="4EC9B0"/>
+                </a:solidFill>
+                <a:effectLst/>
+                <a:latin typeface="ubuntu mono derivative powerline" panose="020B0509030602030204" pitchFamily="49" charset="0"/>
+              </a:rPr>
+              <a:t>tuple</a:t>
+            </a:r>
+            <a:r>
+              <a:rPr lang="en-US" altLang="ko-KR" sz="1100" b="0" dirty="0">
+                <a:solidFill>
+                  <a:srgbClr val="D4D4D4"/>
+                </a:solidFill>
+                <a:effectLst/>
+                <a:latin typeface="ubuntu mono derivative powerline" panose="020B0509030602030204" pitchFamily="49" charset="0"/>
+              </a:rPr>
+              <a:t>(</a:t>
+            </a:r>
+            <a:r>
+              <a:rPr lang="en-US" altLang="ko-KR" sz="1100" b="0" dirty="0">
+                <a:solidFill>
+                  <a:srgbClr val="9CDCFE"/>
+                </a:solidFill>
+                <a:effectLst/>
+                <a:latin typeface="ubuntu mono derivative powerline" panose="020B0509030602030204" pitchFamily="49" charset="0"/>
+              </a:rPr>
+              <a:t>pt1</a:t>
+            </a:r>
+            <a:r>
+              <a:rPr lang="en-US" altLang="ko-KR" sz="1100" b="0" dirty="0">
+                <a:solidFill>
+                  <a:srgbClr val="D4D4D4"/>
+                </a:solidFill>
+                <a:effectLst/>
+                <a:latin typeface="ubuntu mono derivative powerline" panose="020B0509030602030204" pitchFamily="49" charset="0"/>
+              </a:rPr>
+              <a:t>), </a:t>
+            </a:r>
+            <a:r>
+              <a:rPr lang="en-US" altLang="ko-KR" sz="1100" b="0" dirty="0">
+                <a:solidFill>
+                  <a:srgbClr val="4EC9B0"/>
+                </a:solidFill>
+                <a:effectLst/>
+                <a:latin typeface="ubuntu mono derivative powerline" panose="020B0509030602030204" pitchFamily="49" charset="0"/>
+              </a:rPr>
+              <a:t>tuple</a:t>
+            </a:r>
+            <a:r>
+              <a:rPr lang="en-US" altLang="ko-KR" sz="1100" b="0" dirty="0">
+                <a:solidFill>
+                  <a:srgbClr val="D4D4D4"/>
+                </a:solidFill>
+                <a:effectLst/>
+                <a:latin typeface="ubuntu mono derivative powerline" panose="020B0509030602030204" pitchFamily="49" charset="0"/>
+              </a:rPr>
+              <a:t>(</a:t>
+            </a:r>
+            <a:r>
+              <a:rPr lang="en-US" altLang="ko-KR" sz="1100" b="0" dirty="0">
+                <a:solidFill>
+                  <a:srgbClr val="9CDCFE"/>
+                </a:solidFill>
+                <a:effectLst/>
+                <a:latin typeface="ubuntu mono derivative powerline" panose="020B0509030602030204" pitchFamily="49" charset="0"/>
+              </a:rPr>
+              <a:t>pt2</a:t>
+            </a:r>
+            <a:r>
+              <a:rPr lang="en-US" altLang="ko-KR" sz="1100" b="0" dirty="0">
+                <a:solidFill>
+                  <a:srgbClr val="D4D4D4"/>
+                </a:solidFill>
+                <a:effectLst/>
+                <a:latin typeface="ubuntu mono derivative powerline" panose="020B0509030602030204" pitchFamily="49" charset="0"/>
+              </a:rPr>
+              <a:t>), (</a:t>
+            </a:r>
+            <a:r>
+              <a:rPr lang="en-US" altLang="ko-KR" sz="1100" b="0" dirty="0">
+                <a:solidFill>
+                  <a:srgbClr val="B5CEA8"/>
+                </a:solidFill>
+                <a:effectLst/>
+                <a:latin typeface="ubuntu mono derivative powerline" panose="020B0509030602030204" pitchFamily="49" charset="0"/>
+              </a:rPr>
+              <a:t>255</a:t>
+            </a:r>
+            <a:r>
+              <a:rPr lang="en-US" altLang="ko-KR" sz="1100" b="0" dirty="0">
+                <a:solidFill>
+                  <a:srgbClr val="D4D4D4"/>
+                </a:solidFill>
+                <a:effectLst/>
+                <a:latin typeface="ubuntu mono derivative powerline" panose="020B0509030602030204" pitchFamily="49" charset="0"/>
+              </a:rPr>
+              <a:t>, </a:t>
+            </a:r>
+            <a:r>
+              <a:rPr lang="en-US" altLang="ko-KR" sz="1100" b="0" dirty="0">
+                <a:solidFill>
+                  <a:srgbClr val="B5CEA8"/>
+                </a:solidFill>
+                <a:effectLst/>
+                <a:latin typeface="ubuntu mono derivative powerline" panose="020B0509030602030204" pitchFamily="49" charset="0"/>
+              </a:rPr>
+              <a:t>0</a:t>
+            </a:r>
+            <a:r>
+              <a:rPr lang="en-US" altLang="ko-KR" sz="1100" b="0" dirty="0">
+                <a:solidFill>
+                  <a:srgbClr val="D4D4D4"/>
+                </a:solidFill>
+                <a:effectLst/>
+                <a:latin typeface="ubuntu mono derivative powerline" panose="020B0509030602030204" pitchFamily="49" charset="0"/>
+              </a:rPr>
+              <a:t>, </a:t>
+            </a:r>
+            <a:r>
+              <a:rPr lang="en-US" altLang="ko-KR" sz="1100" b="0" dirty="0">
+                <a:solidFill>
+                  <a:srgbClr val="B5CEA8"/>
+                </a:solidFill>
+                <a:effectLst/>
+                <a:latin typeface="ubuntu mono derivative powerline" panose="020B0509030602030204" pitchFamily="49" charset="0"/>
+              </a:rPr>
+              <a:t>0</a:t>
+            </a:r>
+            <a:r>
+              <a:rPr lang="en-US" altLang="ko-KR" sz="1100" b="0" dirty="0">
+                <a:solidFill>
+                  <a:srgbClr val="D4D4D4"/>
+                </a:solidFill>
+                <a:effectLst/>
+                <a:latin typeface="ubuntu mono derivative powerline" panose="020B0509030602030204" pitchFamily="49" charset="0"/>
+              </a:rPr>
+              <a:t>), </a:t>
+            </a:r>
+            <a:r>
+              <a:rPr lang="en-US" altLang="ko-KR" sz="1100" b="0" dirty="0">
+                <a:solidFill>
+                  <a:srgbClr val="B5CEA8"/>
+                </a:solidFill>
+                <a:effectLst/>
+                <a:latin typeface="ubuntu mono derivative powerline" panose="020B0509030602030204" pitchFamily="49" charset="0"/>
+              </a:rPr>
+              <a:t>2</a:t>
+            </a:r>
+            <a:r>
+              <a:rPr lang="en-US" altLang="ko-KR" sz="1100" b="0" dirty="0">
+                <a:solidFill>
+                  <a:srgbClr val="D4D4D4"/>
+                </a:solidFill>
+                <a:effectLst/>
+                <a:latin typeface="ubuntu mono derivative powerline" panose="020B0509030602030204" pitchFamily="49" charset="0"/>
+              </a:rPr>
+              <a:t>, </a:t>
+            </a:r>
+            <a:r>
+              <a:rPr lang="en-US" altLang="ko-KR" sz="1100" b="0" dirty="0">
+                <a:solidFill>
+                  <a:srgbClr val="4EC9B0"/>
+                </a:solidFill>
+                <a:effectLst/>
+                <a:latin typeface="ubuntu mono derivative powerline" panose="020B0509030602030204" pitchFamily="49" charset="0"/>
+              </a:rPr>
+              <a:t>cv2</a:t>
+            </a:r>
+            <a:r>
+              <a:rPr lang="en-US" altLang="ko-KR" sz="1100" b="0" dirty="0">
+                <a:solidFill>
+                  <a:srgbClr val="D4D4D4"/>
+                </a:solidFill>
+                <a:effectLst/>
+                <a:latin typeface="ubuntu mono derivative powerline" panose="020B0509030602030204" pitchFamily="49" charset="0"/>
+              </a:rPr>
+              <a:t>.</a:t>
+            </a:r>
+            <a:r>
+              <a:rPr lang="en-US" altLang="ko-KR" sz="1100" b="0" dirty="0">
+                <a:solidFill>
+                  <a:srgbClr val="9CDCFE"/>
+                </a:solidFill>
+                <a:effectLst/>
+                <a:latin typeface="ubuntu mono derivative powerline" panose="020B0509030602030204" pitchFamily="49" charset="0"/>
+              </a:rPr>
+              <a:t>LINE_AA</a:t>
+            </a:r>
+            <a:r>
+              <a:rPr lang="en-US" altLang="ko-KR" sz="1100" b="0" dirty="0">
+                <a:solidFill>
+                  <a:srgbClr val="D4D4D4"/>
+                </a:solidFill>
+                <a:effectLst/>
+                <a:latin typeface="ubuntu mono derivative powerline" panose="020B0509030602030204" pitchFamily="49" charset="0"/>
+              </a:rPr>
+              <a:t>)</a:t>
+            </a:r>
+          </a:p>
+          <a:p>
+            <a:r>
+              <a:rPr lang="en-US" altLang="ko-KR" sz="1100" b="0" dirty="0">
+                <a:solidFill>
+                  <a:srgbClr val="D4D4D4"/>
+                </a:solidFill>
+                <a:effectLst/>
+                <a:latin typeface="ubuntu mono derivative powerline" panose="020B0509030602030204" pitchFamily="49" charset="0"/>
+              </a:rPr>
+              <a:t>    </a:t>
+            </a:r>
+            <a:r>
+              <a:rPr lang="en-US" altLang="ko-KR" sz="1100" b="0" dirty="0">
+                <a:solidFill>
+                  <a:srgbClr val="C586C0"/>
+                </a:solidFill>
+                <a:effectLst/>
+                <a:latin typeface="ubuntu mono derivative powerline" panose="020B0509030602030204" pitchFamily="49" charset="0"/>
+              </a:rPr>
+              <a:t>return</a:t>
+            </a:r>
+            <a:r>
+              <a:rPr lang="en-US" altLang="ko-KR" sz="1100" b="0" dirty="0">
+                <a:solidFill>
+                  <a:srgbClr val="D4D4D4"/>
+                </a:solidFill>
+                <a:effectLst/>
+                <a:latin typeface="ubuntu mono derivative powerline" panose="020B0509030602030204" pitchFamily="49" charset="0"/>
+              </a:rPr>
+              <a:t> </a:t>
+            </a:r>
+            <a:r>
+              <a:rPr lang="en-US" altLang="ko-KR" sz="1100" b="0" dirty="0" err="1">
+                <a:solidFill>
+                  <a:srgbClr val="9CDCFE"/>
+                </a:solidFill>
+                <a:effectLst/>
+                <a:latin typeface="ubuntu mono derivative powerline" panose="020B0509030602030204" pitchFamily="49" charset="0"/>
+              </a:rPr>
+              <a:t>dst</a:t>
+            </a:r>
             <a:endParaRPr lang="en-US" altLang="ko-KR" sz="1100" b="0" dirty="0">
               <a:solidFill>
                 <a:srgbClr val="9CDCFE"/>
@@ -31777,8 +31975,8 @@
         </p:nvSpPr>
         <p:spPr>
           <a:xfrm>
-            <a:off x="1370269" y="4470068"/>
-            <a:ext cx="2646560" cy="174503"/>
+            <a:off x="1370268" y="4299692"/>
+            <a:ext cx="3057715" cy="344880"/>
           </a:xfrm>
           <a:prstGeom prst="rect">
             <a:avLst/>
@@ -31833,8 +32031,8 @@
         </p:nvCxnSpPr>
         <p:spPr>
           <a:xfrm flipV="1">
-            <a:off x="4016829" y="2615983"/>
-            <a:ext cx="2355371" cy="1941337"/>
+            <a:off x="4427983" y="2615983"/>
+            <a:ext cx="1944217" cy="1856149"/>
           </a:xfrm>
           <a:prstGeom prst="straightConnector1">
             <a:avLst/>
@@ -32184,8 +32382,8 @@
         </p:nvSpPr>
         <p:spPr>
           <a:xfrm>
-            <a:off x="1370269" y="4658754"/>
-            <a:ext cx="2965874" cy="149103"/>
+            <a:off x="1370269" y="4643084"/>
+            <a:ext cx="3049870" cy="339265"/>
           </a:xfrm>
           <a:prstGeom prst="rect">
             <a:avLst/>
@@ -32236,8 +32434,8 @@
         </p:nvSpPr>
         <p:spPr>
           <a:xfrm>
-            <a:off x="1370269" y="4825834"/>
-            <a:ext cx="4642274" cy="149103"/>
+            <a:off x="1370268" y="4979118"/>
+            <a:ext cx="4642274" cy="162181"/>
           </a:xfrm>
           <a:prstGeom prst="rect">
             <a:avLst/>
@@ -32505,8 +32703,8 @@
         </p:nvCxnSpPr>
         <p:spPr>
           <a:xfrm flipV="1">
-            <a:off x="4336143" y="3676205"/>
-            <a:ext cx="2036057" cy="1057101"/>
+            <a:off x="4420139" y="3676205"/>
+            <a:ext cx="1952061" cy="1136512"/>
           </a:xfrm>
           <a:prstGeom prst="straightConnector1">
             <a:avLst/>
@@ -32550,9 +32748,233 @@
           <p:nvPr/>
         </p:nvCxnSpPr>
         <p:spPr>
+          <a:xfrm flipV="1">
+            <a:off x="6012542" y="4901251"/>
+            <a:ext cx="359658" cy="158958"/>
+          </a:xfrm>
+          <a:prstGeom prst="straightConnector1">
+            <a:avLst/>
+          </a:prstGeom>
+          <a:ln w="12700">
+            <a:solidFill>
+              <a:srgbClr val="FF0000"/>
+            </a:solidFill>
+            <a:tailEnd type="triangle"/>
+          </a:ln>
+        </p:spPr>
+        <p:style>
+          <a:lnRef idx="1">
+            <a:schemeClr val="accent1"/>
+          </a:lnRef>
+          <a:fillRef idx="0">
+            <a:schemeClr val="accent1"/>
+          </a:fillRef>
+          <a:effectRef idx="0">
+            <a:schemeClr val="accent1"/>
+          </a:effectRef>
+          <a:fontRef idx="minor">
+            <a:schemeClr val="tx1"/>
+          </a:fontRef>
+        </p:style>
+      </p:cxnSp>
+      <p:sp>
+        <p:nvSpPr>
+          <p:cNvPr id="19" name="직사각형 18">
+            <a:extLst>
+              <a:ext uri="{FF2B5EF4-FFF2-40B4-BE49-F238E27FC236}">
+                <a16:creationId xmlns:a16="http://schemas.microsoft.com/office/drawing/2014/main" id="{6D62285C-64C8-F842-F483-3D41945E68BC}"/>
+              </a:ext>
+            </a:extLst>
+          </p:cNvPr>
+          <p:cNvSpPr/>
+          <p:nvPr/>
+        </p:nvSpPr>
+        <p:spPr>
           <a:xfrm>
-            <a:off x="6012543" y="4900386"/>
-            <a:ext cx="359657" cy="865"/>
+            <a:off x="6372200" y="1102397"/>
+            <a:ext cx="2612976" cy="900246"/>
+          </a:xfrm>
+          <a:prstGeom prst="rect">
+            <a:avLst/>
+          </a:prstGeom>
+          <a:solidFill>
+            <a:srgbClr val="1E1E1E"/>
+          </a:solidFill>
+          <a:ln w="12700">
+            <a:solidFill>
+              <a:srgbClr val="FF0000"/>
+            </a:solidFill>
+          </a:ln>
+          <a:effectLst>
+            <a:softEdge rad="0"/>
+          </a:effectLst>
+        </p:spPr>
+        <p:txBody>
+          <a:bodyPr wrap="square">
+            <a:spAutoFit/>
+          </a:bodyPr>
+          <a:lstStyle/>
+          <a:p>
+            <a:r>
+              <a:rPr lang="ko-KR" altLang="en-US" sz="1050" b="1" dirty="0">
+                <a:solidFill>
+                  <a:srgbClr val="FFFFFF"/>
+                </a:solidFill>
+                <a:effectLst/>
+                <a:latin typeface="ubuntu mono derivative powerline" panose="020B0509030602030204" pitchFamily="49" charset="0"/>
+              </a:rPr>
+              <a:t>극  좌표</a:t>
+            </a:r>
+            <a:r>
+              <a:rPr lang="en-US" altLang="ko-KR" sz="1050" b="1" dirty="0">
+                <a:solidFill>
+                  <a:srgbClr val="FFFFFF"/>
+                </a:solidFill>
+                <a:effectLst/>
+                <a:latin typeface="ubuntu mono derivative powerline" panose="020B0509030602030204" pitchFamily="49" charset="0"/>
+              </a:rPr>
+              <a:t>: (r, theta)</a:t>
+            </a:r>
+          </a:p>
+          <a:p>
+            <a:r>
+              <a:rPr lang="ko-KR" altLang="en-US" sz="1050" b="1" dirty="0">
+                <a:solidFill>
+                  <a:srgbClr val="FFFFFF"/>
+                </a:solidFill>
+                <a:latin typeface="ubuntu mono derivative powerline" panose="020B0509030602030204" pitchFamily="49" charset="0"/>
+              </a:rPr>
+              <a:t>직교좌표</a:t>
+            </a:r>
+            <a:r>
+              <a:rPr lang="en-US" altLang="ko-KR" sz="1050" b="1" dirty="0">
+                <a:solidFill>
+                  <a:srgbClr val="FFFFFF"/>
+                </a:solidFill>
+                <a:latin typeface="ubuntu mono derivative powerline" panose="020B0509030602030204" pitchFamily="49" charset="0"/>
+              </a:rPr>
+              <a:t>: (x, y)</a:t>
+            </a:r>
+          </a:p>
+          <a:p>
+            <a:endParaRPr lang="en-US" altLang="ko-KR" sz="1050" b="1" dirty="0">
+              <a:solidFill>
+                <a:srgbClr val="FFFFFF"/>
+              </a:solidFill>
+              <a:effectLst/>
+              <a:latin typeface="ubuntu mono derivative powerline" panose="020B0509030602030204" pitchFamily="49" charset="0"/>
+            </a:endParaRPr>
+          </a:p>
+          <a:p>
+            <a:r>
+              <a:rPr lang="ko-KR" altLang="en-US" sz="1050" b="1" dirty="0">
+                <a:solidFill>
+                  <a:srgbClr val="FFFFFF"/>
+                </a:solidFill>
+                <a:latin typeface="ubuntu mono derivative powerline" panose="020B0509030602030204" pitchFamily="49" charset="0"/>
+              </a:rPr>
+              <a:t>직선의 방정식으로 선을 그리기 위해</a:t>
+            </a:r>
+            <a:endParaRPr lang="en-US" altLang="ko-KR" sz="1050" b="1" dirty="0">
+              <a:solidFill>
+                <a:srgbClr val="FFFFFF"/>
+              </a:solidFill>
+              <a:latin typeface="ubuntu mono derivative powerline" panose="020B0509030602030204" pitchFamily="49" charset="0"/>
+            </a:endParaRPr>
+          </a:p>
+          <a:p>
+            <a:r>
+              <a:rPr lang="ko-KR" altLang="en-US" sz="1050" b="1" dirty="0">
+                <a:solidFill>
+                  <a:srgbClr val="FFFFFF"/>
+                </a:solidFill>
+                <a:effectLst/>
+                <a:latin typeface="ubuntu mono derivative powerline" panose="020B0509030602030204" pitchFamily="49" charset="0"/>
+              </a:rPr>
+              <a:t>극좌표를 직교좌표로 변환 해 줌</a:t>
+            </a:r>
+            <a:endParaRPr lang="en-US" altLang="ko-KR" sz="1050" b="1" dirty="0">
+              <a:solidFill>
+                <a:srgbClr val="FFFFFF"/>
+              </a:solidFill>
+              <a:effectLst/>
+              <a:latin typeface="ubuntu mono derivative powerline" panose="020B0509030602030204" pitchFamily="49" charset="0"/>
+            </a:endParaRPr>
+          </a:p>
+        </p:txBody>
+      </p:sp>
+      <p:sp>
+        <p:nvSpPr>
+          <p:cNvPr id="21" name="직사각형 20">
+            <a:extLst>
+              <a:ext uri="{FF2B5EF4-FFF2-40B4-BE49-F238E27FC236}">
+                <a16:creationId xmlns:a16="http://schemas.microsoft.com/office/drawing/2014/main" id="{86738CA0-58D6-95D5-1C42-1976B384EDBD}"/>
+              </a:ext>
+            </a:extLst>
+          </p:cNvPr>
+          <p:cNvSpPr/>
+          <p:nvPr/>
+        </p:nvSpPr>
+        <p:spPr>
+          <a:xfrm>
+            <a:off x="1370268" y="2976527"/>
+            <a:ext cx="3057715" cy="982579"/>
+          </a:xfrm>
+          <a:prstGeom prst="rect">
+            <a:avLst/>
+          </a:prstGeom>
+          <a:noFill/>
+          <a:ln w="12700">
+            <a:solidFill>
+              <a:srgbClr val="FF0000"/>
+            </a:solidFill>
+          </a:ln>
+        </p:spPr>
+        <p:style>
+          <a:lnRef idx="2">
+            <a:schemeClr val="accent1">
+              <a:shade val="50000"/>
+            </a:schemeClr>
+          </a:lnRef>
+          <a:fillRef idx="1">
+            <a:schemeClr val="accent1"/>
+          </a:fillRef>
+          <a:effectRef idx="0">
+            <a:schemeClr val="accent1"/>
+          </a:effectRef>
+          <a:fontRef idx="minor">
+            <a:schemeClr val="lt1"/>
+          </a:fontRef>
+        </p:style>
+        <p:txBody>
+          <a:bodyPr rtlCol="0" anchor="ctr"/>
+          <a:lstStyle/>
+          <a:p>
+            <a:pPr algn="ctr"/>
+            <a:endParaRPr lang="ko-KR" altLang="en-US"/>
+          </a:p>
+        </p:txBody>
+      </p:sp>
+      <p:cxnSp>
+        <p:nvCxnSpPr>
+          <p:cNvPr id="22" name="직선 화살표 연결선 21">
+            <a:extLst>
+              <a:ext uri="{FF2B5EF4-FFF2-40B4-BE49-F238E27FC236}">
+                <a16:creationId xmlns:a16="http://schemas.microsoft.com/office/drawing/2014/main" id="{D98456AD-4AF5-BECC-0848-43D67C63435E}"/>
+              </a:ext>
+            </a:extLst>
+          </p:cNvPr>
+          <p:cNvCxnSpPr>
+            <a:cxnSpLocks/>
+            <a:stCxn id="21" idx="3"/>
+            <a:endCxn id="19" idx="1"/>
+          </p:cNvCxnSpPr>
+          <p:nvPr/>
+        </p:nvCxnSpPr>
+        <p:spPr>
+          <a:xfrm flipV="1">
+            <a:off x="4427983" y="1552520"/>
+            <a:ext cx="1944217" cy="1915297"/>
           </a:xfrm>
           <a:prstGeom prst="straightConnector1">
             <a:avLst/>

</xml_diff>